<commit_message>
Changed one slide to remove ugly arrow
</commit_message>
<xml_diff>
--- a/Presentaties/Iteration2.pptx
+++ b/Presentaties/Iteration2.pptx
@@ -5,45 +5,45 @@
     <p:sldMasterId id="2147483648" r:id="rId1"/>
   </p:sldMasterIdLst>
   <p:notesMasterIdLst>
-    <p:notesMasterId r:id="rId6"/>
+    <p:notesMasterId r:id="rId38"/>
   </p:notesMasterIdLst>
   <p:sldIdLst>
-    <p:sldId id="256" r:id="rId3"/>
-    <p:sldId id="257" r:id="rId4"/>
-    <p:sldId id="306" r:id="rId5"/>
-    <p:sldId id="259" r:id="rId7"/>
-    <p:sldId id="260" r:id="rId8"/>
-    <p:sldId id="307" r:id="rId9"/>
-    <p:sldId id="309" r:id="rId10"/>
-    <p:sldId id="319" r:id="rId11"/>
-    <p:sldId id="310" r:id="rId12"/>
-    <p:sldId id="320" r:id="rId13"/>
-    <p:sldId id="308" r:id="rId14"/>
-    <p:sldId id="311" r:id="rId15"/>
-    <p:sldId id="313" r:id="rId16"/>
-    <p:sldId id="314" r:id="rId17"/>
-    <p:sldId id="268" r:id="rId18"/>
-    <p:sldId id="266" r:id="rId19"/>
-    <p:sldId id="265" r:id="rId20"/>
-    <p:sldId id="269" r:id="rId21"/>
-    <p:sldId id="286" r:id="rId22"/>
-    <p:sldId id="287" r:id="rId23"/>
-    <p:sldId id="288" r:id="rId24"/>
-    <p:sldId id="289" r:id="rId25"/>
-    <p:sldId id="270" r:id="rId26"/>
-    <p:sldId id="271" r:id="rId27"/>
-    <p:sldId id="272" r:id="rId28"/>
-    <p:sldId id="316" r:id="rId29"/>
-    <p:sldId id="275" r:id="rId30"/>
-    <p:sldId id="315" r:id="rId31"/>
-    <p:sldId id="277" r:id="rId32"/>
-    <p:sldId id="281" r:id="rId33"/>
-    <p:sldId id="279" r:id="rId34"/>
-    <p:sldId id="280" r:id="rId35"/>
-    <p:sldId id="282" r:id="rId36"/>
-    <p:sldId id="283" r:id="rId37"/>
-    <p:sldId id="284" r:id="rId38"/>
-    <p:sldId id="285" r:id="rId39"/>
+    <p:sldId id="256" r:id="rId2"/>
+    <p:sldId id="257" r:id="rId3"/>
+    <p:sldId id="306" r:id="rId4"/>
+    <p:sldId id="259" r:id="rId5"/>
+    <p:sldId id="260" r:id="rId6"/>
+    <p:sldId id="307" r:id="rId7"/>
+    <p:sldId id="309" r:id="rId8"/>
+    <p:sldId id="319" r:id="rId9"/>
+    <p:sldId id="310" r:id="rId10"/>
+    <p:sldId id="321" r:id="rId11"/>
+    <p:sldId id="308" r:id="rId12"/>
+    <p:sldId id="311" r:id="rId13"/>
+    <p:sldId id="313" r:id="rId14"/>
+    <p:sldId id="314" r:id="rId15"/>
+    <p:sldId id="268" r:id="rId16"/>
+    <p:sldId id="266" r:id="rId17"/>
+    <p:sldId id="265" r:id="rId18"/>
+    <p:sldId id="269" r:id="rId19"/>
+    <p:sldId id="286" r:id="rId20"/>
+    <p:sldId id="287" r:id="rId21"/>
+    <p:sldId id="288" r:id="rId22"/>
+    <p:sldId id="289" r:id="rId23"/>
+    <p:sldId id="270" r:id="rId24"/>
+    <p:sldId id="271" r:id="rId25"/>
+    <p:sldId id="272" r:id="rId26"/>
+    <p:sldId id="316" r:id="rId27"/>
+    <p:sldId id="275" r:id="rId28"/>
+    <p:sldId id="315" r:id="rId29"/>
+    <p:sldId id="277" r:id="rId30"/>
+    <p:sldId id="281" r:id="rId31"/>
+    <p:sldId id="279" r:id="rId32"/>
+    <p:sldId id="280" r:id="rId33"/>
+    <p:sldId id="282" r:id="rId34"/>
+    <p:sldId id="283" r:id="rId35"/>
+    <p:sldId id="284" r:id="rId36"/>
+    <p:sldId id="285" r:id="rId37"/>
   </p:sldIdLst>
   <p:sldSz cx="12192000" cy="6858000"/>
   <p:notesSz cx="6858000" cy="9144000"/>
@@ -149,12 +149,14 @@
           <p14:sldIdLst>
             <p14:sldId id="256"/>
             <p14:sldId id="257"/>
+            <p14:sldId id="306"/>
+            <p14:sldId id="259"/>
             <p14:sldId id="260"/>
             <p14:sldId id="307"/>
             <p14:sldId id="309"/>
             <p14:sldId id="319"/>
             <p14:sldId id="310"/>
-            <p14:sldId id="320"/>
+            <p14:sldId id="321"/>
             <p14:sldId id="308"/>
             <p14:sldId id="311"/>
             <p14:sldId id="313"/>
@@ -181,20 +183,21 @@
             <p14:sldId id="283"/>
             <p14:sldId id="284"/>
             <p14:sldId id="285"/>
-            <p14:sldId id="259"/>
-            <p14:sldId id="306"/>
           </p14:sldIdLst>
         </p14:section>
       </p14:sectionLst>
+    </p:ext>
+    <p:ext uri="{EFAFB233-063F-42B5-8137-9DF3F51BA10A}">
+      <p15:sldGuideLst xmlns:p15="http://schemas.microsoft.com/office/powerpoint/2012/main"/>
     </p:ext>
   </p:extLst>
 </p:presentation>
 </file>
 
 <file path=ppt/charts/chart1.xml><?xml version="1.0" encoding="utf-8"?>
-<c:chartSpace xmlns:c="http://schemas.openxmlformats.org/drawingml/2006/chart" xmlns:a="http://schemas.openxmlformats.org/drawingml/2006/main" xmlns:r="http://schemas.openxmlformats.org/officeDocument/2006/relationships">
+<c:chartSpace xmlns:c="http://schemas.openxmlformats.org/drawingml/2006/chart" xmlns:a="http://schemas.openxmlformats.org/drawingml/2006/main" xmlns:r="http://schemas.openxmlformats.org/officeDocument/2006/relationships" xmlns:c16r2="http://schemas.microsoft.com/office/drawing/2015/06/chart">
   <c:date1904 val="0"/>
-  <c:lang val="zh-CN"/>
+  <c:lang val="nl-NL"/>
   <c:roundedCorners val="0"/>
   <mc:AlternateContent xmlns:mc="http://schemas.openxmlformats.org/markup-compatibility/2006">
     <mc:Choice xmlns:c14="http://schemas.microsoft.com/office/drawing/2007/8/2/chart" Requires="c14">
@@ -224,8 +227,6 @@
               </c:strCache>
             </c:strRef>
           </c:tx>
-          <c:spPr/>
-          <c:explosion val="0"/>
           <c:dPt>
             <c:idx val="0"/>
             <c:bubble3D val="0"/>
@@ -240,6 +241,11 @@
               </a:ln>
               <a:effectLst/>
             </c:spPr>
+            <c:extLst>
+              <c:ext xmlns:c16="http://schemas.microsoft.com/office/drawing/2014/chart" uri="{C3380CC4-5D6E-409C-BE32-E72D297353CC}">
+                <c16:uniqueId val="{00000001-357C-41C6-B519-DC181C277607}"/>
+              </c:ext>
+            </c:extLst>
           </c:dPt>
           <c:dPt>
             <c:idx val="1"/>
@@ -255,6 +261,11 @@
               </a:ln>
               <a:effectLst/>
             </c:spPr>
+            <c:extLst>
+              <c:ext xmlns:c16="http://schemas.microsoft.com/office/drawing/2014/chart" uri="{C3380CC4-5D6E-409C-BE32-E72D297353CC}">
+                <c16:uniqueId val="{00000003-357C-41C6-B519-DC181C277607}"/>
+              </c:ext>
+            </c:extLst>
           </c:dPt>
           <c:dPt>
             <c:idx val="2"/>
@@ -270,11 +281,15 @@
               </a:ln>
               <a:effectLst/>
             </c:spPr>
+            <c:extLst>
+              <c:ext xmlns:c16="http://schemas.microsoft.com/office/drawing/2014/chart" uri="{C3380CC4-5D6E-409C-BE32-E72D297353CC}">
+                <c16:uniqueId val="{00000005-357C-41C6-B519-DC181C277607}"/>
+              </c:ext>
+            </c:extLst>
           </c:dPt>
           <c:dLbls>
             <c:dLbl>
               <c:idx val="0"/>
-              <c:layout/>
               <c:spPr>
                 <a:noFill/>
                 <a:ln>
@@ -296,6 +311,7 @@
                       <a:cs typeface="+mn-cs"/>
                     </a:defRPr>
                   </a:pPr>
+                  <a:endParaRPr lang="en-US"/>
                 </a:p>
               </c:txPr>
               <c:dLblPos val="bestFit"/>
@@ -306,12 +322,13 @@
               <c:showPercent val="0"/>
               <c:showBubbleSize val="0"/>
               <c:extLst>
-                <c:ext xmlns:c15="http://schemas.microsoft.com/office/drawing/2012/chart" uri="{CE6537A1-D6FC-4f65-9D91-7224C49458BB}"/>
+                <c:ext xmlns:c16="http://schemas.microsoft.com/office/drawing/2014/chart" uri="{C3380CC4-5D6E-409C-BE32-E72D297353CC}">
+                  <c16:uniqueId val="{00000001-357C-41C6-B519-DC181C277607}"/>
+                </c:ext>
               </c:extLst>
             </c:dLbl>
             <c:dLbl>
               <c:idx val="1"/>
-              <c:layout/>
               <c:spPr>
                 <a:noFill/>
                 <a:ln>
@@ -333,6 +350,7 @@
                       <a:cs typeface="+mn-cs"/>
                     </a:defRPr>
                   </a:pPr>
+                  <a:endParaRPr lang="en-US"/>
                 </a:p>
               </c:txPr>
               <c:dLblPos val="bestFit"/>
@@ -343,12 +361,13 @@
               <c:showPercent val="0"/>
               <c:showBubbleSize val="0"/>
               <c:extLst>
-                <c:ext xmlns:c15="http://schemas.microsoft.com/office/drawing/2012/chart" uri="{CE6537A1-D6FC-4f65-9D91-7224C49458BB}"/>
+                <c:ext xmlns:c16="http://schemas.microsoft.com/office/drawing/2014/chart" uri="{C3380CC4-5D6E-409C-BE32-E72D297353CC}">
+                  <c16:uniqueId val="{00000003-357C-41C6-B519-DC181C277607}"/>
+                </c:ext>
               </c:extLst>
             </c:dLbl>
             <c:dLbl>
               <c:idx val="2"/>
-              <c:layout/>
               <c:spPr>
                 <a:noFill/>
                 <a:ln>
@@ -370,6 +389,7 @@
                       <a:cs typeface="+mn-cs"/>
                     </a:defRPr>
                   </a:pPr>
+                  <a:endParaRPr lang="en-US"/>
                 </a:p>
               </c:txPr>
               <c:dLblPos val="bestFit"/>
@@ -380,7 +400,9 @@
               <c:showPercent val="0"/>
               <c:showBubbleSize val="0"/>
               <c:extLst>
-                <c:ext xmlns:c15="http://schemas.microsoft.com/office/drawing/2012/chart" uri="{CE6537A1-D6FC-4f65-9D91-7224C49458BB}"/>
+                <c:ext xmlns:c16="http://schemas.microsoft.com/office/drawing/2014/chart" uri="{C3380CC4-5D6E-409C-BE32-E72D297353CC}">
+                  <c16:uniqueId val="{00000005-357C-41C6-B519-DC181C277607}"/>
+                </c:ext>
               </c:extLst>
             </c:dLbl>
             <c:spPr>
@@ -407,6 +429,7 @@
                     <a:cs typeface="+mn-cs"/>
                   </a:defRPr>
                 </a:pPr>
+                <a:endParaRPr lang="en-US"/>
               </a:p>
             </c:txPr>
             <c:dLblPos val="bestFit"/>
@@ -417,25 +440,22 @@
             <c:showPercent val="0"/>
             <c:showBubbleSize val="0"/>
             <c:showLeaderLines val="1"/>
+            <c:leaderLines>
+              <c:spPr>
+                <a:ln w="9525" cap="flat" cmpd="sng" algn="ctr">
+                  <a:solidFill>
+                    <a:schemeClr val="tx1">
+                      <a:lumMod val="35000"/>
+                      <a:lumOff val="65000"/>
+                    </a:schemeClr>
+                  </a:solidFill>
+                  <a:round/>
+                </a:ln>
+                <a:effectLst/>
+              </c:spPr>
+            </c:leaderLines>
             <c:extLst>
-              <c:ext xmlns:c15="http://schemas.microsoft.com/office/drawing/2012/chart" uri="{CE6537A1-D6FC-4f65-9D91-7224C49458BB}">
-                <c15:layout/>
-                <c15:showLeaderLines val="1"/>
-                <c15:leaderLines>
-                  <c:spPr>
-                    <a:ln w="9525" cap="flat" cmpd="sng" algn="ctr">
-                      <a:solidFill>
-                        <a:schemeClr val="tx1">
-                          <a:lumMod val="35000"/>
-                          <a:lumOff val="65000"/>
-                        </a:schemeClr>
-                      </a:solidFill>
-                      <a:round/>
-                    </a:ln>
-                    <a:effectLst/>
-                  </c:spPr>
-                </c15:leaderLines>
-              </c:ext>
+              <c:ext xmlns:c15="http://schemas.microsoft.com/office/drawing/2012/chart" uri="{CE6537A1-D6FC-4f65-9D91-7224C49458BB}"/>
             </c:extLst>
           </c:dLbls>
           <c:cat>
@@ -473,6 +493,11 @@
               </c:numCache>
             </c:numRef>
           </c:val>
+          <c:extLst>
+            <c:ext xmlns:c16="http://schemas.microsoft.com/office/drawing/2014/chart" uri="{C3380CC4-5D6E-409C-BE32-E72D297353CC}">
+              <c16:uniqueId val="{00000006-357C-41C6-B519-DC181C277607}"/>
+            </c:ext>
+          </c:extLst>
         </c:ser>
         <c:dLbls>
           <c:showLegendKey val="0"/>
@@ -511,9 +536,10 @@
       <a:pPr>
         <a:defRPr lang="en-US"/>
       </a:pPr>
+      <a:endParaRPr lang="en-US"/>
     </a:p>
   </c:txPr>
-  <c:externalData r:id="rId1">
+  <c:externalData r:id="rId3">
     <c:autoUpdate val="0"/>
   </c:externalData>
 </c:chartSpace>
@@ -1160,6 +1186,7 @@
           <a:p>
             <a:fld id="{3EFD42F7-718C-4B98-AAEC-167E6DDD60A7}" type="datetimeFigureOut">
               <a:rPr lang="en-US" smtClean="0"/>
+              <a:t>4/29/2019</a:t>
             </a:fld>
             <a:endParaRPr lang="en-US"/>
           </a:p>
@@ -1223,42 +1250,37 @@
           <a:p>
             <a:pPr lvl="0"/>
             <a:r>
-              <a:rPr lang="en-US" smtClean="0"/>
+              <a:rPr lang="en-US"/>
               <a:t>Click to edit Master text styles</a:t>
             </a:r>
-            <a:endParaRPr lang="en-US" smtClean="0"/>
           </a:p>
           <a:p>
             <a:pPr lvl="1"/>
             <a:r>
-              <a:rPr lang="en-US" smtClean="0"/>
+              <a:rPr lang="en-US"/>
               <a:t>Second level</a:t>
             </a:r>
-            <a:endParaRPr lang="en-US" smtClean="0"/>
           </a:p>
           <a:p>
             <a:pPr lvl="2"/>
             <a:r>
-              <a:rPr lang="en-US" smtClean="0"/>
+              <a:rPr lang="en-US"/>
               <a:t>Third level</a:t>
             </a:r>
-            <a:endParaRPr lang="en-US" smtClean="0"/>
           </a:p>
           <a:p>
             <a:pPr lvl="3"/>
             <a:r>
-              <a:rPr lang="en-US" smtClean="0"/>
+              <a:rPr lang="en-US"/>
               <a:t>Fourth level</a:t>
             </a:r>
-            <a:endParaRPr lang="en-US" smtClean="0"/>
           </a:p>
           <a:p>
             <a:pPr lvl="4"/>
             <a:r>
-              <a:rPr lang="en-US" smtClean="0"/>
+              <a:rPr lang="en-US"/>
               <a:t>Fifth level</a:t>
             </a:r>
-            <a:endParaRPr lang="en-US"/>
           </a:p>
         </p:txBody>
       </p:sp>
@@ -1322,6 +1344,7 @@
           <a:p>
             <a:fld id="{21B2AA4F-B828-4D7C-AFD3-893933DAFCB4}" type="slidenum">
               <a:rPr lang="en-US" smtClean="0"/>
+              <a:t>‹nr.›</a:t>
             </a:fld>
             <a:endParaRPr lang="en-US"/>
           </a:p>
@@ -1434,11 +1457,20 @@
         <p:cNvGrpSpPr/>
         <p:nvPr/>
       </p:nvGrpSpPr>
-      <p:grpSpPr/>
+      <p:grpSpPr>
+        <a:xfrm>
+          <a:off x="0" y="0"/>
+          <a:ext cx="0" cy="0"/>
+          <a:chOff x="0" y="0"/>
+          <a:chExt cx="0" cy="0"/>
+        </a:xfrm>
+      </p:grpSpPr>
       <p:sp>
         <p:nvSpPr>
           <p:cNvPr id="2" name="Slide Image Placeholder 1"/>
-          <p:cNvSpPr/>
+          <p:cNvSpPr>
+            <a:spLocks noGrp="1" noRot="1" noChangeAspect="1"/>
+          </p:cNvSpPr>
           <p:nvPr>
             <p:ph type="sldImg" idx="2"/>
           </p:nvPr>
@@ -1448,7 +1480,9 @@
       <p:sp>
         <p:nvSpPr>
           <p:cNvPr id="3" name="Text Placeholder 2"/>
-          <p:cNvSpPr/>
+          <p:cNvSpPr>
+            <a:spLocks noGrp="1"/>
+          </p:cNvSpPr>
           <p:nvPr>
             <p:ph type="body" idx="3"/>
           </p:nvPr>
@@ -1456,6 +1490,7 @@
         <p:spPr/>
         <p:txBody>
           <a:bodyPr/>
+          <a:lstStyle/>
           <a:p>
             <a:endParaRPr lang="en-US"/>
           </a:p>
@@ -1470,7 +1505,7 @@
 </file>
 
 <file path=ppt/slideLayouts/slideLayout1.xml><?xml version="1.0" encoding="utf-8"?>
-<p:sldLayout xmlns:a="http://schemas.openxmlformats.org/drawingml/2006/main" xmlns:r="http://schemas.openxmlformats.org/officeDocument/2006/relationships" xmlns:p="http://schemas.openxmlformats.org/presentationml/2006/main" type="title" preserve="1" showMasterSp="0">
+<p:sldLayout xmlns:a="http://schemas.openxmlformats.org/drawingml/2006/main" xmlns:r="http://schemas.openxmlformats.org/officeDocument/2006/relationships" xmlns:p="http://schemas.openxmlformats.org/presentationml/2006/main" showMasterSp="0" type="title" preserve="1">
   <p:cSld name="Title Slide">
     <p:spTree>
       <p:nvGrpSpPr>
@@ -1695,6 +1730,7 @@
           <a:p>
             <a:fld id="{C6ACF9C8-6D65-41F9-9101-DBF005E879DE}" type="datetimeFigureOut">
               <a:rPr lang="en-US" smtClean="0"/>
+              <a:t>4/29/2019</a:t>
             </a:fld>
             <a:endParaRPr lang="en-US"/>
           </a:p>
@@ -1736,6 +1772,7 @@
           <a:p>
             <a:fld id="{ABBCC5BB-7559-4F86-B19F-0508DBA45658}" type="slidenum">
               <a:rPr lang="en-US" smtClean="0"/>
+              <a:t>‹nr.›</a:t>
             </a:fld>
             <a:endParaRPr lang="en-US"/>
           </a:p>
@@ -1847,7 +1884,6 @@
               <a:rPr lang="en-US"/>
               <a:t>Click to edit Master text styles</a:t>
             </a:r>
-            <a:endParaRPr lang="en-US"/>
           </a:p>
           <a:p>
             <a:pPr lvl="1"/>
@@ -1855,7 +1891,6 @@
               <a:rPr lang="en-US"/>
               <a:t>Second level</a:t>
             </a:r>
-            <a:endParaRPr lang="en-US"/>
           </a:p>
           <a:p>
             <a:pPr lvl="2"/>
@@ -1863,7 +1898,6 @@
               <a:rPr lang="en-US"/>
               <a:t>Third level</a:t>
             </a:r>
-            <a:endParaRPr lang="en-US"/>
           </a:p>
           <a:p>
             <a:pPr lvl="3"/>
@@ -1871,7 +1905,6 @@
               <a:rPr lang="en-US"/>
               <a:t>Fourth level</a:t>
             </a:r>
-            <a:endParaRPr lang="en-US"/>
           </a:p>
           <a:p>
             <a:pPr lvl="4"/>
@@ -1900,6 +1933,7 @@
           <a:p>
             <a:fld id="{C6ACF9C8-6D65-41F9-9101-DBF005E879DE}" type="datetimeFigureOut">
               <a:rPr lang="en-US" smtClean="0"/>
+              <a:t>4/29/2019</a:t>
             </a:fld>
             <a:endParaRPr lang="en-US"/>
           </a:p>
@@ -1941,6 +1975,7 @@
           <a:p>
             <a:fld id="{ABBCC5BB-7559-4F86-B19F-0508DBA45658}" type="slidenum">
               <a:rPr lang="en-US" smtClean="0"/>
+              <a:t>‹nr.›</a:t>
             </a:fld>
             <a:endParaRPr lang="en-US"/>
           </a:p>
@@ -1955,7 +1990,7 @@
 </file>
 
 <file path=ppt/slideLayouts/slideLayout11.xml><?xml version="1.0" encoding="utf-8"?>
-<p:sldLayout xmlns:a="http://schemas.openxmlformats.org/drawingml/2006/main" xmlns:r="http://schemas.openxmlformats.org/officeDocument/2006/relationships" xmlns:p="http://schemas.openxmlformats.org/presentationml/2006/main" type="vertTitleAndTx" preserve="1" showMasterSp="0">
+<p:sldLayout xmlns:a="http://schemas.openxmlformats.org/drawingml/2006/main" xmlns:r="http://schemas.openxmlformats.org/officeDocument/2006/relationships" xmlns:p="http://schemas.openxmlformats.org/presentationml/2006/main" showMasterSp="0" type="vertTitleAndTx" preserve="1">
   <p:cSld name="Vertical Title and Text">
     <p:spTree>
       <p:nvGrpSpPr>
@@ -2100,7 +2135,6 @@
               <a:rPr lang="en-US"/>
               <a:t>Click to edit Master text styles</a:t>
             </a:r>
-            <a:endParaRPr lang="en-US"/>
           </a:p>
           <a:p>
             <a:pPr lvl="1"/>
@@ -2108,7 +2142,6 @@
               <a:rPr lang="en-US"/>
               <a:t>Second level</a:t>
             </a:r>
-            <a:endParaRPr lang="en-US"/>
           </a:p>
           <a:p>
             <a:pPr lvl="2"/>
@@ -2116,7 +2149,6 @@
               <a:rPr lang="en-US"/>
               <a:t>Third level</a:t>
             </a:r>
-            <a:endParaRPr lang="en-US"/>
           </a:p>
           <a:p>
             <a:pPr lvl="3"/>
@@ -2124,7 +2156,6 @@
               <a:rPr lang="en-US"/>
               <a:t>Fourth level</a:t>
             </a:r>
-            <a:endParaRPr lang="en-US"/>
           </a:p>
           <a:p>
             <a:pPr lvl="4"/>
@@ -2153,6 +2184,7 @@
           <a:p>
             <a:fld id="{C6ACF9C8-6D65-41F9-9101-DBF005E879DE}" type="datetimeFigureOut">
               <a:rPr lang="en-US" smtClean="0"/>
+              <a:t>4/29/2019</a:t>
             </a:fld>
             <a:endParaRPr lang="en-US"/>
           </a:p>
@@ -2194,6 +2226,7 @@
           <a:p>
             <a:fld id="{ABBCC5BB-7559-4F86-B19F-0508DBA45658}" type="slidenum">
               <a:rPr lang="en-US" smtClean="0"/>
+              <a:t>‹nr.›</a:t>
             </a:fld>
             <a:endParaRPr lang="en-US"/>
           </a:p>
@@ -2271,7 +2304,6 @@
               <a:rPr lang="en-US"/>
               <a:t>Click to edit Master text styles</a:t>
             </a:r>
-            <a:endParaRPr lang="en-US"/>
           </a:p>
           <a:p>
             <a:pPr lvl="1"/>
@@ -2279,7 +2311,6 @@
               <a:rPr lang="en-US"/>
               <a:t>Second level</a:t>
             </a:r>
-            <a:endParaRPr lang="en-US"/>
           </a:p>
           <a:p>
             <a:pPr lvl="2"/>
@@ -2287,7 +2318,6 @@
               <a:rPr lang="en-US"/>
               <a:t>Third level</a:t>
             </a:r>
-            <a:endParaRPr lang="en-US"/>
           </a:p>
           <a:p>
             <a:pPr lvl="3"/>
@@ -2295,7 +2325,6 @@
               <a:rPr lang="en-US"/>
               <a:t>Fourth level</a:t>
             </a:r>
-            <a:endParaRPr lang="en-US"/>
           </a:p>
           <a:p>
             <a:pPr lvl="4"/>
@@ -2324,6 +2353,7 @@
           <a:p>
             <a:fld id="{C6ACF9C8-6D65-41F9-9101-DBF005E879DE}" type="datetimeFigureOut">
               <a:rPr lang="en-US" smtClean="0"/>
+              <a:t>4/29/2019</a:t>
             </a:fld>
             <a:endParaRPr lang="en-US"/>
           </a:p>
@@ -2365,6 +2395,7 @@
           <a:p>
             <a:fld id="{ABBCC5BB-7559-4F86-B19F-0508DBA45658}" type="slidenum">
               <a:rPr lang="en-US" smtClean="0"/>
+              <a:t>‹nr.›</a:t>
             </a:fld>
             <a:endParaRPr lang="en-US"/>
           </a:p>
@@ -2379,7 +2410,7 @@
 </file>
 
 <file path=ppt/slideLayouts/slideLayout3.xml><?xml version="1.0" encoding="utf-8"?>
-<p:sldLayout xmlns:a="http://schemas.openxmlformats.org/drawingml/2006/main" xmlns:r="http://schemas.openxmlformats.org/officeDocument/2006/relationships" xmlns:p="http://schemas.openxmlformats.org/presentationml/2006/main" type="secHead" preserve="1" showMasterSp="0">
+<p:sldLayout xmlns:a="http://schemas.openxmlformats.org/drawingml/2006/main" xmlns:r="http://schemas.openxmlformats.org/officeDocument/2006/relationships" xmlns:p="http://schemas.openxmlformats.org/presentationml/2006/main" showMasterSp="0" type="secHead" preserve="1">
   <p:cSld name="Section Header">
     <p:bg>
       <p:bgPr>
@@ -2640,7 +2671,6 @@
               <a:rPr lang="en-US"/>
               <a:t>Click to edit Master text styles</a:t>
             </a:r>
-            <a:endParaRPr lang="en-US"/>
           </a:p>
         </p:txBody>
       </p:sp>
@@ -2661,6 +2691,7 @@
           <a:p>
             <a:fld id="{C6ACF9C8-6D65-41F9-9101-DBF005E879DE}" type="datetimeFigureOut">
               <a:rPr lang="en-US" smtClean="0"/>
+              <a:t>4/29/2019</a:t>
             </a:fld>
             <a:endParaRPr lang="en-US"/>
           </a:p>
@@ -2702,6 +2733,7 @@
           <a:p>
             <a:fld id="{ABBCC5BB-7559-4F86-B19F-0508DBA45658}" type="slidenum">
               <a:rPr lang="en-US" smtClean="0"/>
+              <a:t>‹nr.›</a:t>
             </a:fld>
             <a:endParaRPr lang="en-US"/>
           </a:p>
@@ -2823,7 +2855,6 @@
               <a:rPr lang="en-US"/>
               <a:t>Click to edit Master text styles</a:t>
             </a:r>
-            <a:endParaRPr lang="en-US"/>
           </a:p>
           <a:p>
             <a:pPr lvl="1"/>
@@ -2831,7 +2862,6 @@
               <a:rPr lang="en-US"/>
               <a:t>Second level</a:t>
             </a:r>
-            <a:endParaRPr lang="en-US"/>
           </a:p>
           <a:p>
             <a:pPr lvl="2"/>
@@ -2839,7 +2869,6 @@
               <a:rPr lang="en-US"/>
               <a:t>Third level</a:t>
             </a:r>
-            <a:endParaRPr lang="en-US"/>
           </a:p>
           <a:p>
             <a:pPr lvl="3"/>
@@ -2847,7 +2876,6 @@
               <a:rPr lang="en-US"/>
               <a:t>Fourth level</a:t>
             </a:r>
-            <a:endParaRPr lang="en-US"/>
           </a:p>
           <a:p>
             <a:pPr lvl="4"/>
@@ -2884,7 +2912,6 @@
               <a:rPr lang="en-US"/>
               <a:t>Click to edit Master text styles</a:t>
             </a:r>
-            <a:endParaRPr lang="en-US"/>
           </a:p>
           <a:p>
             <a:pPr lvl="1"/>
@@ -2892,7 +2919,6 @@
               <a:rPr lang="en-US"/>
               <a:t>Second level</a:t>
             </a:r>
-            <a:endParaRPr lang="en-US"/>
           </a:p>
           <a:p>
             <a:pPr lvl="2"/>
@@ -2900,7 +2926,6 @@
               <a:rPr lang="en-US"/>
               <a:t>Third level</a:t>
             </a:r>
-            <a:endParaRPr lang="en-US"/>
           </a:p>
           <a:p>
             <a:pPr lvl="3"/>
@@ -2908,7 +2933,6 @@
               <a:rPr lang="en-US"/>
               <a:t>Fourth level</a:t>
             </a:r>
-            <a:endParaRPr lang="en-US"/>
           </a:p>
           <a:p>
             <a:pPr lvl="4"/>
@@ -2937,6 +2961,7 @@
           <a:p>
             <a:fld id="{C6ACF9C8-6D65-41F9-9101-DBF005E879DE}" type="datetimeFigureOut">
               <a:rPr lang="en-US" smtClean="0"/>
+              <a:t>4/29/2019</a:t>
             </a:fld>
             <a:endParaRPr lang="en-US"/>
           </a:p>
@@ -2978,6 +3003,7 @@
           <a:p>
             <a:fld id="{ABBCC5BB-7559-4F86-B19F-0508DBA45658}" type="slidenum">
               <a:rPr lang="en-US" smtClean="0"/>
+              <a:t>‹nr.›</a:t>
             </a:fld>
             <a:endParaRPr lang="en-US"/>
           </a:p>
@@ -3104,7 +3130,6 @@
               <a:rPr lang="en-US"/>
               <a:t>Click to edit Master text styles</a:t>
             </a:r>
-            <a:endParaRPr lang="en-US"/>
           </a:p>
         </p:txBody>
       </p:sp>
@@ -3133,7 +3158,6 @@
               <a:rPr lang="en-US"/>
               <a:t>Click to edit Master text styles</a:t>
             </a:r>
-            <a:endParaRPr lang="en-US"/>
           </a:p>
           <a:p>
             <a:pPr lvl="1"/>
@@ -3141,7 +3165,6 @@
               <a:rPr lang="en-US"/>
               <a:t>Second level</a:t>
             </a:r>
-            <a:endParaRPr lang="en-US"/>
           </a:p>
           <a:p>
             <a:pPr lvl="2"/>
@@ -3149,7 +3172,6 @@
               <a:rPr lang="en-US"/>
               <a:t>Third level</a:t>
             </a:r>
-            <a:endParaRPr lang="en-US"/>
           </a:p>
           <a:p>
             <a:pPr lvl="3"/>
@@ -3157,7 +3179,6 @@
               <a:rPr lang="en-US"/>
               <a:t>Fourth level</a:t>
             </a:r>
-            <a:endParaRPr lang="en-US"/>
           </a:p>
           <a:p>
             <a:pPr lvl="4"/>
@@ -3237,7 +3258,6 @@
               <a:rPr lang="en-US"/>
               <a:t>Click to edit Master text styles</a:t>
             </a:r>
-            <a:endParaRPr lang="en-US"/>
           </a:p>
         </p:txBody>
       </p:sp>
@@ -3266,7 +3286,6 @@
               <a:rPr lang="en-US"/>
               <a:t>Click to edit Master text styles</a:t>
             </a:r>
-            <a:endParaRPr lang="en-US"/>
           </a:p>
           <a:p>
             <a:pPr lvl="1"/>
@@ -3274,7 +3293,6 @@
               <a:rPr lang="en-US"/>
               <a:t>Second level</a:t>
             </a:r>
-            <a:endParaRPr lang="en-US"/>
           </a:p>
           <a:p>
             <a:pPr lvl="2"/>
@@ -3282,7 +3300,6 @@
               <a:rPr lang="en-US"/>
               <a:t>Third level</a:t>
             </a:r>
-            <a:endParaRPr lang="en-US"/>
           </a:p>
           <a:p>
             <a:pPr lvl="3"/>
@@ -3290,7 +3307,6 @@
               <a:rPr lang="en-US"/>
               <a:t>Fourth level</a:t>
             </a:r>
-            <a:endParaRPr lang="en-US"/>
           </a:p>
           <a:p>
             <a:pPr lvl="4"/>
@@ -3319,6 +3335,7 @@
           <a:p>
             <a:fld id="{C6ACF9C8-6D65-41F9-9101-DBF005E879DE}" type="datetimeFigureOut">
               <a:rPr lang="en-US" smtClean="0"/>
+              <a:t>4/29/2019</a:t>
             </a:fld>
             <a:endParaRPr lang="en-US"/>
           </a:p>
@@ -3360,6 +3377,7 @@
           <a:p>
             <a:fld id="{ABBCC5BB-7559-4F86-B19F-0508DBA45658}" type="slidenum">
               <a:rPr lang="en-US" smtClean="0"/>
+              <a:t>‹nr.›</a:t>
             </a:fld>
             <a:endParaRPr lang="en-US"/>
           </a:p>
@@ -3430,6 +3448,7 @@
           <a:p>
             <a:fld id="{C6ACF9C8-6D65-41F9-9101-DBF005E879DE}" type="datetimeFigureOut">
               <a:rPr lang="en-US" smtClean="0"/>
+              <a:t>4/29/2019</a:t>
             </a:fld>
             <a:endParaRPr lang="en-US"/>
           </a:p>
@@ -3471,6 +3490,7 @@
           <a:p>
             <a:fld id="{ABBCC5BB-7559-4F86-B19F-0508DBA45658}" type="slidenum">
               <a:rPr lang="en-US" smtClean="0"/>
+              <a:t>‹nr.›</a:t>
             </a:fld>
             <a:endParaRPr lang="en-US"/>
           </a:p>
@@ -3485,7 +3505,7 @@
 </file>
 
 <file path=ppt/slideLayouts/slideLayout7.xml><?xml version="1.0" encoding="utf-8"?>
-<p:sldLayout xmlns:a="http://schemas.openxmlformats.org/drawingml/2006/main" xmlns:r="http://schemas.openxmlformats.org/officeDocument/2006/relationships" xmlns:p="http://schemas.openxmlformats.org/presentationml/2006/main" type="blank" preserve="1" showMasterSp="0">
+<p:sldLayout xmlns:a="http://schemas.openxmlformats.org/drawingml/2006/main" xmlns:r="http://schemas.openxmlformats.org/officeDocument/2006/relationships" xmlns:p="http://schemas.openxmlformats.org/presentationml/2006/main" showMasterSp="0" type="blank" preserve="1">
   <p:cSld name="Blank">
     <p:spTree>
       <p:nvGrpSpPr>
@@ -3594,6 +3614,7 @@
           <a:p>
             <a:fld id="{C6ACF9C8-6D65-41F9-9101-DBF005E879DE}" type="datetimeFigureOut">
               <a:rPr lang="en-US" smtClean="0"/>
+              <a:t>4/29/2019</a:t>
             </a:fld>
             <a:endParaRPr lang="en-US"/>
           </a:p>
@@ -3643,6 +3664,7 @@
           <a:p>
             <a:fld id="{ABBCC5BB-7559-4F86-B19F-0508DBA45658}" type="slidenum">
               <a:rPr lang="en-US" smtClean="0"/>
+              <a:t>‹nr.›</a:t>
             </a:fld>
             <a:endParaRPr lang="en-US"/>
           </a:p>
@@ -3657,7 +3679,7 @@
 </file>
 
 <file path=ppt/slideLayouts/slideLayout8.xml><?xml version="1.0" encoding="utf-8"?>
-<p:sldLayout xmlns:a="http://schemas.openxmlformats.org/drawingml/2006/main" xmlns:r="http://schemas.openxmlformats.org/officeDocument/2006/relationships" xmlns:p="http://schemas.openxmlformats.org/presentationml/2006/main" type="objTx" preserve="1" showMasterSp="0">
+<p:sldLayout xmlns:a="http://schemas.openxmlformats.org/drawingml/2006/main" xmlns:r="http://schemas.openxmlformats.org/officeDocument/2006/relationships" xmlns:p="http://schemas.openxmlformats.org/presentationml/2006/main" showMasterSp="0" type="objTx" preserve="1">
   <p:cSld name="Content with Caption">
     <p:spTree>
       <p:nvGrpSpPr>
@@ -3812,7 +3834,6 @@
               <a:rPr lang="en-US"/>
               <a:t>Click to edit Master text styles</a:t>
             </a:r>
-            <a:endParaRPr lang="en-US"/>
           </a:p>
           <a:p>
             <a:pPr lvl="1"/>
@@ -3820,7 +3841,6 @@
               <a:rPr lang="en-US"/>
               <a:t>Second level</a:t>
             </a:r>
-            <a:endParaRPr lang="en-US"/>
           </a:p>
           <a:p>
             <a:pPr lvl="2"/>
@@ -3828,7 +3848,6 @@
               <a:rPr lang="en-US"/>
               <a:t>Third level</a:t>
             </a:r>
-            <a:endParaRPr lang="en-US"/>
           </a:p>
           <a:p>
             <a:pPr lvl="3"/>
@@ -3836,7 +3855,6 @@
               <a:rPr lang="en-US"/>
               <a:t>Fourth level</a:t>
             </a:r>
-            <a:endParaRPr lang="en-US"/>
           </a:p>
           <a:p>
             <a:pPr lvl="4"/>
@@ -3916,7 +3934,6 @@
               <a:rPr lang="en-US"/>
               <a:t>Click to edit Master text styles</a:t>
             </a:r>
-            <a:endParaRPr lang="en-US"/>
           </a:p>
         </p:txBody>
       </p:sp>
@@ -3946,6 +3963,7 @@
           <a:p>
             <a:fld id="{C6ACF9C8-6D65-41F9-9101-DBF005E879DE}" type="datetimeFigureOut">
               <a:rPr lang="en-US" smtClean="0"/>
+              <a:t>4/29/2019</a:t>
             </a:fld>
             <a:endParaRPr lang="en-US"/>
           </a:p>
@@ -4008,6 +4026,7 @@
           <a:p>
             <a:fld id="{ABBCC5BB-7559-4F86-B19F-0508DBA45658}" type="slidenum">
               <a:rPr lang="en-US" smtClean="0"/>
+              <a:t>‹nr.›</a:t>
             </a:fld>
             <a:endParaRPr lang="en-US"/>
           </a:p>
@@ -4022,7 +4041,7 @@
 </file>
 
 <file path=ppt/slideLayouts/slideLayout9.xml><?xml version="1.0" encoding="utf-8"?>
-<p:sldLayout xmlns:a="http://schemas.openxmlformats.org/drawingml/2006/main" xmlns:r="http://schemas.openxmlformats.org/officeDocument/2006/relationships" xmlns:p="http://schemas.openxmlformats.org/presentationml/2006/main" type="picTx" preserve="1" showMasterSp="0">
+<p:sldLayout xmlns:a="http://schemas.openxmlformats.org/drawingml/2006/main" xmlns:r="http://schemas.openxmlformats.org/officeDocument/2006/relationships" xmlns:p="http://schemas.openxmlformats.org/presentationml/2006/main" showMasterSp="0" type="picTx" preserve="1">
   <p:cSld name="Picture with Caption">
     <p:spTree>
       <p:nvGrpSpPr>
@@ -4301,7 +4320,6 @@
               <a:rPr lang="en-US"/>
               <a:t>Click to edit Master text styles</a:t>
             </a:r>
-            <a:endParaRPr lang="en-US"/>
           </a:p>
         </p:txBody>
       </p:sp>
@@ -4322,6 +4340,7 @@
           <a:p>
             <a:fld id="{C6ACF9C8-6D65-41F9-9101-DBF005E879DE}" type="datetimeFigureOut">
               <a:rPr lang="en-US" smtClean="0"/>
+              <a:t>4/29/2019</a:t>
             </a:fld>
             <a:endParaRPr lang="en-US"/>
           </a:p>
@@ -4363,6 +4382,7 @@
           <a:p>
             <a:fld id="{ABBCC5BB-7559-4F86-B19F-0508DBA45658}" type="slidenum">
               <a:rPr lang="en-US" smtClean="0"/>
+              <a:t>‹nr.›</a:t>
             </a:fld>
             <a:endParaRPr lang="en-US"/>
           </a:p>
@@ -4537,7 +4557,6 @@
               <a:rPr lang="en-US"/>
               <a:t>Click to edit Master text styles</a:t>
             </a:r>
-            <a:endParaRPr lang="en-US"/>
           </a:p>
           <a:p>
             <a:pPr lvl="1"/>
@@ -4545,7 +4564,6 @@
               <a:rPr lang="en-US"/>
               <a:t>Second level</a:t>
             </a:r>
-            <a:endParaRPr lang="en-US"/>
           </a:p>
           <a:p>
             <a:pPr lvl="2"/>
@@ -4553,7 +4571,6 @@
               <a:rPr lang="en-US"/>
               <a:t>Third level</a:t>
             </a:r>
-            <a:endParaRPr lang="en-US"/>
           </a:p>
           <a:p>
             <a:pPr lvl="3"/>
@@ -4561,7 +4578,6 @@
               <a:rPr lang="en-US"/>
               <a:t>Fourth level</a:t>
             </a:r>
-            <a:endParaRPr lang="en-US"/>
           </a:p>
           <a:p>
             <a:pPr lvl="4"/>
@@ -4606,6 +4622,7 @@
           <a:p>
             <a:fld id="{C6ACF9C8-6D65-41F9-9101-DBF005E879DE}" type="datetimeFigureOut">
               <a:rPr lang="en-US" smtClean="0"/>
+              <a:t>4/29/2019</a:t>
             </a:fld>
             <a:endParaRPr lang="en-US"/>
           </a:p>
@@ -4679,6 +4696,7 @@
           <a:p>
             <a:fld id="{ABBCC5BB-7559-4F86-B19F-0508DBA45658}" type="slidenum">
               <a:rPr lang="en-US" smtClean="0"/>
+              <a:t>‹nr.›</a:t>
             </a:fld>
             <a:endParaRPr lang="en-US"/>
           </a:p>
@@ -5160,7 +5178,6 @@
               <a:rPr lang="nl-BE" sz="7200" dirty="0"/>
               <a:t>Iteration 2</a:t>
             </a:r>
-            <a:endParaRPr lang="nl-BE" sz="7200" dirty="0"/>
           </a:p>
         </p:txBody>
       </p:sp>
@@ -5207,7 +5224,6 @@
               <a:rPr lang="nl-BE" dirty="0"/>
               <a:t>Tom De Backer</a:t>
             </a:r>
-            <a:endParaRPr lang="nl-BE" dirty="0"/>
           </a:p>
           <a:p>
             <a:r>
@@ -5235,19 +5251,30 @@
         <p:cNvGrpSpPr/>
         <p:nvPr/>
       </p:nvGrpSpPr>
-      <p:grpSpPr/>
+      <p:grpSpPr>
+        <a:xfrm>
+          <a:off x="0" y="0"/>
+          <a:ext cx="0" cy="0"/>
+          <a:chOff x="0" y="0"/>
+          <a:chExt cx="0" cy="0"/>
+        </a:xfrm>
+      </p:grpSpPr>
       <p:pic>
         <p:nvPicPr>
-          <p:cNvPr id="4" name="Content Placeholder 3" descr="ui"/>
+          <p:cNvPr id="2" name="Content Placeholder 3" descr="ui">
+            <a:extLst>
+              <a:ext uri="{FF2B5EF4-FFF2-40B4-BE49-F238E27FC236}">
+                <a16:creationId xmlns:a16="http://schemas.microsoft.com/office/drawing/2014/main" id="{3F912707-AAC8-45A6-8FEA-0A626AEA94ED}"/>
+              </a:ext>
+            </a:extLst>
+          </p:cNvPr>
           <p:cNvPicPr>
             <a:picLocks noChangeAspect="1"/>
           </p:cNvPicPr>
-          <p:nvPr>
-            <p:ph idx="1"/>
-          </p:nvPr>
+          <p:nvPr/>
         </p:nvPicPr>
         <p:blipFill>
-          <a:blip r:embed="rId1"/>
+          <a:blip r:embed="rId2"/>
           <a:srcRect l="34488" t="46951"/>
           <a:stretch>
             <a:fillRect/>
@@ -5264,6 +5291,11 @@
         </p:spPr>
       </p:pic>
     </p:spTree>
+    <p:extLst>
+      <p:ext uri="{BB962C8B-B14F-4D97-AF65-F5344CB8AC3E}">
+        <p14:creationId xmlns:p14="http://schemas.microsoft.com/office/powerpoint/2010/main" val="1421500211"/>
+      </p:ext>
+    </p:extLst>
   </p:cSld>
   <p:clrMapOvr>
     <a:masterClrMapping/>
@@ -5280,7 +5312,14 @@
         <p:cNvGrpSpPr/>
         <p:nvPr/>
       </p:nvGrpSpPr>
-      <p:grpSpPr/>
+      <p:grpSpPr>
+        <a:xfrm>
+          <a:off x="0" y="0"/>
+          <a:ext cx="0" cy="0"/>
+          <a:chOff x="0" y="0"/>
+          <a:chExt cx="0" cy="0"/>
+        </a:xfrm>
+      </p:grpSpPr>
       <p:sp>
         <p:nvSpPr>
           <p:cNvPr id="2" name="Title 1"/>
@@ -5294,12 +5333,12 @@
         <p:spPr/>
         <p:txBody>
           <a:bodyPr/>
+          <a:lstStyle/>
           <a:p>
             <a:r>
               <a:rPr lang="" altLang="en-US"/>
               <a:t>1. Design: Domain</a:t>
             </a:r>
-            <a:endParaRPr lang="" altLang="en-US"/>
           </a:p>
         </p:txBody>
       </p:sp>
@@ -5307,14 +5346,14 @@
         <p:nvPicPr>
           <p:cNvPr id="6" name="Content Placeholder 5" descr="domain"/>
           <p:cNvPicPr>
-            <a:picLocks noChangeAspect="1"/>
+            <a:picLocks noGrp="1" noChangeAspect="1"/>
           </p:cNvPicPr>
           <p:nvPr>
             <p:ph idx="1"/>
           </p:nvPr>
         </p:nvPicPr>
         <p:blipFill>
-          <a:blip r:embed="rId1"/>
+          <a:blip r:embed="rId2"/>
           <a:stretch>
             <a:fillRect/>
           </a:stretch>
@@ -5346,7 +5385,14 @@
         <p:cNvGrpSpPr/>
         <p:nvPr/>
       </p:nvGrpSpPr>
-      <p:grpSpPr/>
+      <p:grpSpPr>
+        <a:xfrm>
+          <a:off x="0" y="0"/>
+          <a:ext cx="0" cy="0"/>
+          <a:chOff x="0" y="0"/>
+          <a:chExt cx="0" cy="0"/>
+        </a:xfrm>
+      </p:grpSpPr>
       <p:sp>
         <p:nvSpPr>
           <p:cNvPr id="2" name="Title 1"/>
@@ -5360,12 +5406,12 @@
         <p:spPr/>
         <p:txBody>
           <a:bodyPr/>
+          <a:lstStyle/>
           <a:p>
             <a:r>
               <a:rPr lang="" altLang="en-US"/>
               <a:t>1. Design: handling subwindows</a:t>
             </a:r>
-            <a:endParaRPr lang="" altLang="en-US"/>
           </a:p>
         </p:txBody>
       </p:sp>
@@ -5373,14 +5419,14 @@
         <p:nvPicPr>
           <p:cNvPr id="4" name="Content Placeholder 3" descr="Screenshot from 2019-04-29 15.39.31"/>
           <p:cNvPicPr>
-            <a:picLocks noChangeAspect="1"/>
+            <a:picLocks noGrp="1" noChangeAspect="1"/>
           </p:cNvPicPr>
           <p:nvPr>
             <p:ph idx="1"/>
           </p:nvPr>
         </p:nvPicPr>
         <p:blipFill>
-          <a:blip r:embed="rId1"/>
+          <a:blip r:embed="rId2"/>
           <a:srcRect l="2424" t="13198"/>
           <a:stretch>
             <a:fillRect/>
@@ -5416,6 +5462,7 @@
           <a:bodyPr wrap="square" rtlCol="0">
             <a:spAutoFit/>
           </a:bodyPr>
+          <a:lstStyle/>
           <a:p>
             <a:pPr marL="285750" indent="-285750">
               <a:buFont typeface="Arial" panose="02080604020202020204" pitchFamily="34" charset="0"/>
@@ -5425,7 +5472,6 @@
               <a:rPr lang="" altLang="en-US"/>
               <a:t>WindowManager holds all UI's/Subwindows</a:t>
             </a:r>
-            <a:endParaRPr lang="" altLang="en-US"/>
           </a:p>
         </p:txBody>
       </p:sp>
@@ -5446,7 +5492,14 @@
         <p:cNvGrpSpPr/>
         <p:nvPr/>
       </p:nvGrpSpPr>
-      <p:grpSpPr/>
+      <p:grpSpPr>
+        <a:xfrm>
+          <a:off x="0" y="0"/>
+          <a:ext cx="0" cy="0"/>
+          <a:chOff x="0" y="0"/>
+          <a:chExt cx="0" cy="0"/>
+        </a:xfrm>
+      </p:grpSpPr>
       <p:sp>
         <p:nvSpPr>
           <p:cNvPr id="2" name="Title 1"/>
@@ -5460,12 +5513,12 @@
         <p:spPr/>
         <p:txBody>
           <a:bodyPr/>
+          <a:lstStyle/>
           <a:p>
             <a:r>
               <a:rPr lang="en-US" altLang="en-US"/>
               <a:t>1. Design: handling subwindows</a:t>
             </a:r>
-            <a:endParaRPr lang="en-US" altLang="en-US"/>
           </a:p>
         </p:txBody>
       </p:sp>
@@ -5473,14 +5526,14 @@
         <p:nvPicPr>
           <p:cNvPr id="4" name="Content Placeholder 3" descr="Screenshot from 2019-04-29 15.39.31"/>
           <p:cNvPicPr>
-            <a:picLocks noChangeAspect="1"/>
+            <a:picLocks noGrp="1" noChangeAspect="1"/>
           </p:cNvPicPr>
           <p:nvPr>
             <p:ph idx="1"/>
           </p:nvPr>
         </p:nvPicPr>
         <p:blipFill>
-          <a:blip r:embed="rId1"/>
+          <a:blip r:embed="rId2"/>
           <a:srcRect l="2424" t="13198"/>
           <a:stretch>
             <a:fillRect/>
@@ -5516,6 +5569,7 @@
           <a:bodyPr wrap="square" rtlCol="0">
             <a:spAutoFit/>
           </a:bodyPr>
+          <a:lstStyle/>
           <a:p>
             <a:pPr marL="285750" indent="-285750">
               <a:buFont typeface="Arial" panose="02080604020202020204" pitchFamily="34" charset="0"/>
@@ -5525,7 +5579,6 @@
               <a:rPr lang="en-US" altLang="en-US"/>
               <a:t>WindowManager holds all UI's/Subwindows</a:t>
             </a:r>
-            <a:endParaRPr lang="en-US" altLang="en-US"/>
           </a:p>
         </p:txBody>
       </p:sp>
@@ -5549,6 +5602,7 @@
           <a:bodyPr wrap="square" rtlCol="0">
             <a:spAutoFit/>
           </a:bodyPr>
+          <a:lstStyle/>
           <a:p>
             <a:pPr marL="285750" indent="-285750">
               <a:buFont typeface="Arial" panose="02080604020202020204" pitchFamily="34" charset="0"/>
@@ -5558,7 +5612,6 @@
               <a:rPr lang="" altLang="en-US"/>
               <a:t>Opening/Closing means activating/deactivating </a:t>
             </a:r>
-            <a:endParaRPr lang="" altLang="en-US"/>
           </a:p>
         </p:txBody>
       </p:sp>
@@ -5571,7 +5624,7 @@
           <p:nvPr/>
         </p:nvPicPr>
         <p:blipFill>
-          <a:blip r:embed="rId2"/>
+          <a:blip r:embed="rId3"/>
           <a:srcRect t="15072"/>
           <a:stretch>
             <a:fillRect/>
@@ -5604,7 +5657,14 @@
         <p:cNvGrpSpPr/>
         <p:nvPr/>
       </p:nvGrpSpPr>
-      <p:grpSpPr/>
+      <p:grpSpPr>
+        <a:xfrm>
+          <a:off x="0" y="0"/>
+          <a:ext cx="0" cy="0"/>
+          <a:chOff x="0" y="0"/>
+          <a:chExt cx="0" cy="0"/>
+        </a:xfrm>
+      </p:grpSpPr>
       <p:sp>
         <p:nvSpPr>
           <p:cNvPr id="2" name="Title 1"/>
@@ -5618,12 +5678,12 @@
         <p:spPr/>
         <p:txBody>
           <a:bodyPr/>
+          <a:lstStyle/>
           <a:p>
             <a:r>
               <a:rPr lang="" altLang="en-US"/>
               <a:t>1. Design: handling subwindows</a:t>
             </a:r>
-            <a:endParaRPr lang="" altLang="en-US"/>
           </a:p>
         </p:txBody>
       </p:sp>
@@ -5640,6 +5700,7 @@
         <p:spPr/>
         <p:txBody>
           <a:bodyPr/>
+          <a:lstStyle/>
           <a:p>
             <a:pPr>
               <a:buFont typeface="Arial" panose="02080604020202020204" pitchFamily="34" charset="0"/>
@@ -5649,7 +5710,6 @@
               <a:rPr lang="" altLang="en-US"/>
               <a:t> Opening a subwindow multiple times means cloning an existing UI at different coordinates</a:t>
             </a:r>
-            <a:endParaRPr lang="" altLang="en-US"/>
           </a:p>
           <a:p>
             <a:pPr>
@@ -5697,7 +5757,7 @@
           <p:nvPr/>
         </p:nvPicPr>
         <p:blipFill>
-          <a:blip r:embed="rId1"/>
+          <a:blip r:embed="rId2"/>
           <a:stretch>
             <a:fillRect/>
           </a:stretch>
@@ -5793,9 +5853,6 @@
               </a:rPr>
               <a:t>All program logic is contained in the loadUI method of UI's, can be modified in one place.</a:t>
             </a:r>
-            <a:endParaRPr lang="" altLang="nl-BE" dirty="0">
-              <a:sym typeface="Wingdings" panose="05000000000000000000" pitchFamily="2" charset="2"/>
-            </a:endParaRPr>
           </a:p>
           <a:p>
             <a:pPr>
@@ -5817,9 +5874,6 @@
               </a:rPr>
               <a:t>UI and Domain stand on their own, collect all actions in List&lt;Runnable&gt;. Additional concepts can always follow this logic.</a:t>
             </a:r>
-            <a:endParaRPr lang="" altLang="nl-BE" dirty="0">
-              <a:sym typeface="Wingdings" panose="05000000000000000000" pitchFamily="2" charset="2"/>
-            </a:endParaRPr>
           </a:p>
         </p:txBody>
       </p:sp>
@@ -5903,7 +5957,7 @@
           <p:nvPr/>
         </p:nvPicPr>
         <p:blipFill>
-          <a:blip r:embed="rId1"/>
+          <a:blip r:embed="rId2"/>
           <a:stretch>
             <a:fillRect/>
           </a:stretch>
@@ -5938,6 +5992,7 @@
           <a:bodyPr wrap="square" rtlCol="0">
             <a:spAutoFit/>
           </a:bodyPr>
+          <a:lstStyle/>
           <a:p>
             <a:pPr marL="285750" indent="-285750">
               <a:lnSpc>
@@ -5950,7 +6005,6 @@
               <a:rPr lang="" altLang="en-US"/>
               <a:t>Start by testing all Use Cases (55% coverage)</a:t>
             </a:r>
-            <a:endParaRPr lang="" altLang="en-US"/>
           </a:p>
           <a:p>
             <a:pPr marL="285750" indent="-285750">
@@ -5964,7 +6018,6 @@
               <a:rPr lang="" altLang="en-US"/>
               <a:t>Improve coverage with focused testing of remaining parts</a:t>
             </a:r>
-            <a:endParaRPr lang="" altLang="en-US"/>
           </a:p>
         </p:txBody>
       </p:sp>
@@ -6028,14 +6081,14 @@
         <p:nvPicPr>
           <p:cNvPr id="4" name="Content Placeholder 3"/>
           <p:cNvPicPr>
-            <a:picLocks noChangeAspect="1"/>
+            <a:picLocks noGrp="1" noChangeAspect="1"/>
           </p:cNvPicPr>
           <p:nvPr>
             <p:ph idx="1"/>
           </p:nvPr>
         </p:nvPicPr>
         <p:blipFill>
-          <a:blip r:embed="rId1"/>
+          <a:blip r:embed="rId2"/>
           <a:stretch>
             <a:fillRect/>
           </a:stretch>
@@ -6114,7 +6167,9 @@
       <p:sp>
         <p:nvSpPr>
           <p:cNvPr id="2" name="Content Placeholder 1"/>
-          <p:cNvSpPr/>
+          <p:cNvSpPr>
+            <a:spLocks noGrp="1"/>
+          </p:cNvSpPr>
           <p:nvPr>
             <p:ph idx="1"/>
           </p:nvPr>
@@ -6129,6 +6184,7 @@
           <a:bodyPr>
             <a:normAutofit/>
           </a:bodyPr>
+          <a:lstStyle/>
           <a:p>
             <a:r>
               <a:rPr lang="" altLang="en-US" sz="1800"/>
@@ -6138,7 +6194,6 @@
               <a:rPr lang="" altLang="en-US" sz="1800" u="sng"/>
               <a:t>2687</a:t>
             </a:r>
-            <a:endParaRPr lang="" altLang="en-US" sz="1800" u="sng"/>
           </a:p>
           <a:p>
             <a:endParaRPr lang="" altLang="en-US" sz="1800" u="sng"/>
@@ -6178,7 +6233,7 @@
         </p:xfrm>
         <a:graphic>
           <a:graphicData uri="http://schemas.openxmlformats.org/drawingml/2006/chart">
-            <c:chart xmlns:c="http://schemas.openxmlformats.org/drawingml/2006/chart" xmlns:r="http://schemas.openxmlformats.org/officeDocument/2006/relationships" r:id="rId1"/>
+            <c:chart xmlns:c="http://schemas.openxmlformats.org/drawingml/2006/chart" xmlns:r="http://schemas.openxmlformats.org/officeDocument/2006/relationships" r:id="rId2"/>
           </a:graphicData>
         </a:graphic>
       </p:graphicFrame>
@@ -6202,12 +6257,12 @@
           <a:bodyPr wrap="square" rtlCol="0">
             <a:spAutoFit/>
           </a:bodyPr>
+          <a:lstStyle/>
           <a:p>
             <a:r>
               <a:rPr lang="" altLang="en-US"/>
               <a:t>CanvasWindow</a:t>
             </a:r>
-            <a:endParaRPr lang="" altLang="en-US"/>
           </a:p>
         </p:txBody>
       </p:sp>
@@ -6231,12 +6286,12 @@
           <a:bodyPr wrap="square" rtlCol="0">
             <a:spAutoFit/>
           </a:bodyPr>
+          <a:lstStyle/>
           <a:p>
             <a:r>
               <a:rPr lang="" altLang="en-US"/>
               <a:t>paint() </a:t>
             </a:r>
-            <a:endParaRPr lang="" altLang="en-US"/>
           </a:p>
         </p:txBody>
       </p:sp>
@@ -6260,12 +6315,12 @@
           <a:bodyPr wrap="square" rtlCol="0">
             <a:spAutoFit/>
           </a:bodyPr>
+          <a:lstStyle/>
           <a:p>
             <a:r>
               <a:rPr lang="" altLang="en-US"/>
               <a:t>Our code</a:t>
             </a:r>
-            <a:endParaRPr lang="" altLang="en-US"/>
           </a:p>
         </p:txBody>
       </p:sp>
@@ -6289,12 +6344,12 @@
           <a:bodyPr wrap="square" rtlCol="0">
             <a:spAutoFit/>
           </a:bodyPr>
+          <a:lstStyle/>
           <a:p>
             <a:r>
               <a:rPr lang="" altLang="en-US"/>
               <a:t>Coverage without CanvasWindow and paint(): 92.4%</a:t>
             </a:r>
-            <a:endParaRPr lang="" altLang="en-US"/>
           </a:p>
         </p:txBody>
       </p:sp>
@@ -6346,7 +6401,6 @@
               <a:rPr lang="nl-BE" dirty="0"/>
               <a:t> of project management</a:t>
             </a:r>
-            <a:endParaRPr lang="nl-BE" dirty="0"/>
           </a:p>
         </p:txBody>
       </p:sp>
@@ -6363,7 +6417,7 @@
         <p:spPr/>
         <p:txBody>
           <a:bodyPr>
-            <a:normAutofit lnSpcReduction="10000"/>
+            <a:normAutofit/>
           </a:bodyPr>
           <a:lstStyle/>
           <a:p>
@@ -6379,7 +6433,6 @@
               <a:rPr lang="nl-BE" dirty="0"/>
               <a:t>iteration: </a:t>
             </a:r>
-            <a:endParaRPr lang="nl-BE" dirty="0"/>
           </a:p>
           <a:p>
             <a:pPr>
@@ -6398,7 +6451,6 @@
               <a:rPr lang="nl-BE" dirty="0"/>
               <a:t>: Martijn</a:t>
             </a:r>
-            <a:endParaRPr lang="nl-BE" dirty="0"/>
           </a:p>
           <a:p>
             <a:pPr>
@@ -6444,7 +6496,6 @@
               <a:rPr lang="nl-BE" dirty="0"/>
               <a:t>: Tom &amp; Quinten </a:t>
             </a:r>
-            <a:endParaRPr lang="nl-BE" dirty="0"/>
           </a:p>
           <a:p>
             <a:pPr marL="0" indent="0">
@@ -6639,7 +6690,6 @@
               <a:rPr lang="" altLang="nl-BE" dirty="0"/>
               <a:t>: then vs Now</a:t>
             </a:r>
-            <a:endParaRPr lang="" altLang="nl-BE" dirty="0"/>
           </a:p>
         </p:txBody>
       </p:sp>
@@ -6654,7 +6704,7 @@
           </p:nvPr>
         </p:nvPicPr>
         <p:blipFill rotWithShape="1">
-          <a:blip r:embed="rId1">
+          <a:blip r:embed="rId2">
             <a:extLst>
               <a:ext uri="{28A0092B-C50C-407E-A947-70E740481C1C}">
                 <a14:useLocalDpi xmlns:a14="http://schemas.microsoft.com/office/drawing/2010/main" val="0"/>
@@ -6696,6 +6746,7 @@
           <a:bodyPr wrap="square" rtlCol="0">
             <a:spAutoFit/>
           </a:bodyPr>
+          <a:lstStyle/>
           <a:p>
             <a:pPr indent="0">
               <a:lnSpc>
@@ -6708,7 +6759,6 @@
               <a:rPr lang="" altLang="en-US"/>
               <a:t>Iteration 1:</a:t>
             </a:r>
-            <a:endParaRPr lang="" altLang="en-US"/>
           </a:p>
           <a:p>
             <a:pPr marL="285750" indent="-285750">
@@ -6730,7 +6780,6 @@
               <a:rPr lang="" altLang="en-US"/>
               <a:t> to modify Domain or UI</a:t>
             </a:r>
-            <a:endParaRPr lang="" altLang="en-US"/>
           </a:p>
           <a:p>
             <a:pPr marL="285750" indent="-285750">
@@ -6744,7 +6793,6 @@
               <a:rPr lang="" altLang="en-US"/>
               <a:t>CommunicationManager made use of UIFacade and DomainFacade	 </a:t>
             </a:r>
-            <a:endParaRPr lang="" altLang="en-US"/>
           </a:p>
         </p:txBody>
       </p:sp>
@@ -6868,11 +6916,7 @@
             </a:r>
             <a:r>
               <a:rPr lang="" altLang="nl-BE" dirty="0"/>
-              <a:t>25 </a:t>
-            </a:r>
-            <a:r>
-              <a:rPr lang="" altLang="nl-BE" dirty="0"/>
-              <a:t>hours</a:t>
+              <a:t>25 hours</a:t>
             </a:r>
             <a:endParaRPr lang="nl-BE" dirty="0"/>
           </a:p>
@@ -7571,7 +7615,7 @@
         <p:spPr/>
         <p:txBody>
           <a:bodyPr>
-            <a:normAutofit lnSpcReduction="10000"/>
+            <a:normAutofit/>
           </a:bodyPr>
           <a:lstStyle/>
           <a:p>
@@ -7582,7 +7626,6 @@
               <a:rPr lang="" altLang="en-US"/>
               <a:t>Find UIElement that needs to act upon input</a:t>
             </a:r>
-            <a:endParaRPr lang="" altLang="en-US"/>
           </a:p>
           <a:p>
             <a:pPr marL="457200" indent="-457200">
@@ -7624,7 +7667,6 @@
               <a:rPr lang="" altLang="en-US"/>
               <a:t> Notify other UIElements if Domain changed</a:t>
             </a:r>
-            <a:endParaRPr lang="" altLang="en-US"/>
           </a:p>
           <a:p>
             <a:pPr marL="0" indent="0">
@@ -7716,14 +7758,14 @@
         <p:nvPicPr>
           <p:cNvPr id="4" name="Content Placeholder 3" descr="useCase1"/>
           <p:cNvPicPr>
-            <a:picLocks noChangeAspect="1"/>
+            <a:picLocks noGrp="1" noChangeAspect="1"/>
           </p:cNvPicPr>
           <p:nvPr>
             <p:ph idx="1"/>
           </p:nvPr>
         </p:nvPicPr>
         <p:blipFill>
-          <a:blip r:embed="rId1"/>
+          <a:blip r:embed="rId2"/>
           <a:stretch>
             <a:fillRect/>
           </a:stretch>
@@ -7806,14 +7848,14 @@
         <p:nvPicPr>
           <p:cNvPr id="3" name="Content Placeholder 2" descr="usecase2"/>
           <p:cNvPicPr>
-            <a:picLocks noChangeAspect="1"/>
+            <a:picLocks noGrp="1" noChangeAspect="1"/>
           </p:cNvPicPr>
           <p:nvPr>
             <p:ph idx="1"/>
           </p:nvPr>
         </p:nvPicPr>
         <p:blipFill>
-          <a:blip r:embed="rId1"/>
+          <a:blip r:embed="rId2"/>
           <a:srcRect b="40688"/>
           <a:stretch>
             <a:fillRect/>
@@ -7846,7 +7888,14 @@
         <p:cNvGrpSpPr/>
         <p:nvPr/>
       </p:nvGrpSpPr>
-      <p:grpSpPr/>
+      <p:grpSpPr>
+        <a:xfrm>
+          <a:off x="0" y="0"/>
+          <a:ext cx="0" cy="0"/>
+          <a:chOff x="0" y="0"/>
+          <a:chExt cx="0" cy="0"/>
+        </a:xfrm>
+      </p:grpSpPr>
       <p:sp>
         <p:nvSpPr>
           <p:cNvPr id="2" name="Title 1"/>
@@ -7860,6 +7909,7 @@
         <p:spPr/>
         <p:txBody>
           <a:bodyPr/>
+          <a:lstStyle/>
           <a:p>
             <a:r>
               <a:rPr lang="nl-BE" dirty="0">
@@ -7897,9 +7947,6 @@
               </a:rPr>
               <a:t>(continued)</a:t>
             </a:r>
-            <a:endParaRPr lang="" altLang="nl-BE" dirty="0">
-              <a:sym typeface="+mn-ea"/>
-            </a:endParaRPr>
           </a:p>
         </p:txBody>
       </p:sp>
@@ -7907,14 +7954,14 @@
         <p:nvPicPr>
           <p:cNvPr id="4" name="Content Placeholder 3" descr="usecase2"/>
           <p:cNvPicPr>
-            <a:picLocks noChangeAspect="1"/>
+            <a:picLocks noGrp="1" noChangeAspect="1"/>
           </p:cNvPicPr>
           <p:nvPr>
             <p:ph idx="1"/>
           </p:nvPr>
         </p:nvPicPr>
         <p:blipFill>
-          <a:blip r:embed="rId1"/>
+          <a:blip r:embed="rId2"/>
           <a:srcRect t="62105"/>
           <a:stretch>
             <a:fillRect/>
@@ -7991,14 +8038,14 @@
         <p:nvPicPr>
           <p:cNvPr id="7" name="Content Placeholder 6" descr="useCase3"/>
           <p:cNvPicPr>
-            <a:picLocks noChangeAspect="1"/>
+            <a:picLocks noGrp="1" noChangeAspect="1"/>
           </p:cNvPicPr>
           <p:nvPr>
             <p:ph idx="1"/>
           </p:nvPr>
         </p:nvPicPr>
         <p:blipFill>
-          <a:blip r:embed="rId1"/>
+          <a:blip r:embed="rId2"/>
           <a:srcRect b="4218"/>
           <a:stretch>
             <a:fillRect/>
@@ -8031,7 +8078,14 @@
         <p:cNvGrpSpPr/>
         <p:nvPr/>
       </p:nvGrpSpPr>
-      <p:grpSpPr/>
+      <p:grpSpPr>
+        <a:xfrm>
+          <a:off x="0" y="0"/>
+          <a:ext cx="0" cy="0"/>
+          <a:chOff x="0" y="0"/>
+          <a:chExt cx="0" cy="0"/>
+        </a:xfrm>
+      </p:grpSpPr>
       <p:sp>
         <p:nvSpPr>
           <p:cNvPr id="2" name="Title 1"/>
@@ -8045,12 +8099,12 @@
         <p:spPr/>
         <p:txBody>
           <a:bodyPr/>
+          <a:lstStyle/>
           <a:p>
             <a:r>
               <a:rPr lang="" altLang="en-US"/>
               <a:t>4. Open a Table </a:t>
             </a:r>
-            <a:endParaRPr lang="" altLang="en-US"/>
           </a:p>
         </p:txBody>
       </p:sp>
@@ -8058,14 +8112,14 @@
         <p:nvPicPr>
           <p:cNvPr id="4" name="Content Placeholder 3" descr="useCase4"/>
           <p:cNvPicPr>
-            <a:picLocks noChangeAspect="1"/>
+            <a:picLocks noGrp="1" noChangeAspect="1"/>
           </p:cNvPicPr>
           <p:nvPr>
             <p:ph idx="1"/>
           </p:nvPr>
         </p:nvPicPr>
         <p:blipFill>
-          <a:blip r:embed="rId1"/>
+          <a:blip r:embed="rId2"/>
           <a:stretch>
             <a:fillRect/>
           </a:stretch>
@@ -8145,14 +8199,14 @@
         <p:nvPicPr>
           <p:cNvPr id="4" name="Content Placeholder 3" descr="useCase5"/>
           <p:cNvPicPr>
-            <a:picLocks noChangeAspect="1"/>
+            <a:picLocks noGrp="1" noChangeAspect="1"/>
           </p:cNvPicPr>
           <p:nvPr>
             <p:ph idx="1"/>
           </p:nvPr>
         </p:nvPicPr>
         <p:blipFill>
-          <a:blip r:embed="rId1"/>
+          <a:blip r:embed="rId2"/>
           <a:stretch>
             <a:fillRect/>
           </a:stretch>
@@ -8184,7 +8238,14 @@
         <p:cNvGrpSpPr/>
         <p:nvPr/>
       </p:nvGrpSpPr>
-      <p:grpSpPr/>
+      <p:grpSpPr>
+        <a:xfrm>
+          <a:off x="0" y="0"/>
+          <a:ext cx="0" cy="0"/>
+          <a:chOff x="0" y="0"/>
+          <a:chExt cx="0" cy="0"/>
+        </a:xfrm>
+      </p:grpSpPr>
       <p:sp>
         <p:nvSpPr>
           <p:cNvPr id="2" name="Title 1"/>
@@ -8198,12 +8259,12 @@
         <p:spPr/>
         <p:txBody>
           <a:bodyPr/>
+          <a:lstStyle/>
           <a:p>
             <a:r>
               <a:rPr lang="" altLang="en-US"/>
               <a:t>1. Design: then vs Now</a:t>
             </a:r>
-            <a:endParaRPr lang="" altLang="en-US"/>
           </a:p>
         </p:txBody>
       </p:sp>
@@ -8220,6 +8281,7 @@
         <p:spPr/>
         <p:txBody>
           <a:bodyPr/>
+          <a:lstStyle/>
           <a:p>
             <a:pPr marL="0" indent="0">
               <a:buNone/>
@@ -8228,7 +8290,6 @@
               <a:rPr lang="" altLang="en-US"/>
               <a:t>Iteration 2:</a:t>
             </a:r>
-            <a:endParaRPr lang="" altLang="en-US"/>
           </a:p>
           <a:p>
             <a:pPr>
@@ -8279,7 +8340,6 @@
               <a:rPr lang="" altLang="en-US"/>
               <a:t> Classes</a:t>
             </a:r>
-            <a:endParaRPr lang="" altLang="en-US"/>
           </a:p>
           <a:p>
             <a:pPr marL="0" indent="0">
@@ -8299,7 +8359,7 @@
           <p:nvPr/>
         </p:nvPicPr>
         <p:blipFill>
-          <a:blip r:embed="rId1"/>
+          <a:blip r:embed="rId3"/>
           <a:srcRect t="17164"/>
           <a:stretch>
             <a:fillRect/>
@@ -8365,6 +8425,7 @@
         </p:style>
         <p:txBody>
           <a:bodyPr rtlCol="0" anchor="ctr"/>
+          <a:lstStyle/>
           <a:p>
             <a:pPr algn="ctr"/>
             <a:endParaRPr lang="en-US"/>
@@ -8421,6 +8482,7 @@
         </p:style>
         <p:txBody>
           <a:bodyPr rtlCol="0" anchor="ctr"/>
+          <a:lstStyle/>
           <a:p>
             <a:pPr algn="ctr"/>
             <a:endParaRPr lang="en-US"/>
@@ -8475,6 +8537,7 @@
         </p:style>
         <p:txBody>
           <a:bodyPr rtlCol="0" anchor="ctr"/>
+          <a:lstStyle/>
           <a:p>
             <a:pPr algn="ctr"/>
             <a:endParaRPr lang="en-US"/>
@@ -8529,6 +8592,7 @@
         </p:style>
         <p:txBody>
           <a:bodyPr rtlCol="0" anchor="ctr"/>
+          <a:lstStyle/>
           <a:p>
             <a:pPr algn="ctr"/>
             <a:endParaRPr lang="en-US"/>
@@ -8583,6 +8647,7 @@
         </p:style>
         <p:txBody>
           <a:bodyPr rtlCol="0" anchor="ctr"/>
+          <a:lstStyle/>
           <a:p>
             <a:pPr algn="ctr"/>
             <a:endParaRPr lang="en-US"/>
@@ -8637,6 +8702,7 @@
         </p:style>
         <p:txBody>
           <a:bodyPr rtlCol="0" anchor="ctr"/>
+          <a:lstStyle/>
           <a:p>
             <a:pPr algn="ctr"/>
             <a:endParaRPr lang="en-US"/>
@@ -8708,7 +8774,6 @@
               <a:rPr lang="" altLang="nl-BE" dirty="0" err="1"/>
               <a:t>(a)</a:t>
             </a:r>
-            <a:endParaRPr lang="" altLang="nl-BE" dirty="0" err="1"/>
           </a:p>
         </p:txBody>
       </p:sp>
@@ -8716,14 +8781,14 @@
         <p:nvPicPr>
           <p:cNvPr id="4" name="Content Placeholder 3" descr="useCase6.1a"/>
           <p:cNvPicPr>
-            <a:picLocks noChangeAspect="1"/>
+            <a:picLocks noGrp="1" noChangeAspect="1"/>
           </p:cNvPicPr>
           <p:nvPr>
             <p:ph idx="1"/>
           </p:nvPr>
         </p:nvPicPr>
         <p:blipFill>
-          <a:blip r:embed="rId1"/>
+          <a:blip r:embed="rId2"/>
           <a:stretch>
             <a:fillRect/>
           </a:stretch>
@@ -8806,14 +8871,14 @@
         <p:nvPicPr>
           <p:cNvPr id="4" name="Content Placeholder 3" descr="useCase6.1b"/>
           <p:cNvPicPr>
-            <a:picLocks noChangeAspect="1"/>
+            <a:picLocks noGrp="1" noChangeAspect="1"/>
           </p:cNvPicPr>
           <p:nvPr>
             <p:ph idx="1"/>
           </p:nvPr>
         </p:nvPicPr>
         <p:blipFill>
-          <a:blip r:embed="rId1"/>
+          <a:blip r:embed="rId2"/>
           <a:stretch>
             <a:fillRect/>
           </a:stretch>
@@ -8947,14 +9012,14 @@
         <p:nvPicPr>
           <p:cNvPr id="4" name="Content Placeholder 3" descr="useCase6.1c"/>
           <p:cNvPicPr>
-            <a:picLocks noChangeAspect="1"/>
+            <a:picLocks noGrp="1" noChangeAspect="1"/>
           </p:cNvPicPr>
           <p:nvPr>
             <p:ph idx="1"/>
           </p:nvPr>
         </p:nvPicPr>
         <p:blipFill>
-          <a:blip r:embed="rId1"/>
+          <a:blip r:embed="rId2"/>
           <a:stretch>
             <a:fillRect/>
           </a:stretch>
@@ -9026,14 +9091,14 @@
         <p:nvPicPr>
           <p:cNvPr id="4" name="Content Placeholder 3" descr="useCase7"/>
           <p:cNvPicPr>
-            <a:picLocks noChangeAspect="1"/>
+            <a:picLocks noGrp="1" noChangeAspect="1"/>
           </p:cNvPicPr>
           <p:nvPr>
             <p:ph idx="1"/>
           </p:nvPr>
         </p:nvPicPr>
         <p:blipFill>
-          <a:blip r:embed="rId1"/>
+          <a:blip r:embed="rId2"/>
           <a:stretch>
             <a:fillRect/>
           </a:stretch>
@@ -9112,14 +9177,14 @@
         <p:nvPicPr>
           <p:cNvPr id="4" name="Content Placeholder 3" descr="useCase8"/>
           <p:cNvPicPr>
-            <a:picLocks noChangeAspect="1"/>
+            <a:picLocks noGrp="1" noChangeAspect="1"/>
           </p:cNvPicPr>
           <p:nvPr>
             <p:ph idx="1"/>
           </p:nvPr>
         </p:nvPicPr>
         <p:blipFill>
-          <a:blip r:embed="rId1"/>
+          <a:blip r:embed="rId2"/>
           <a:stretch>
             <a:fillRect/>
           </a:stretch>
@@ -9202,14 +9267,14 @@
         <p:nvPicPr>
           <p:cNvPr id="4" name="Content Placeholder 3" descr="useCase9"/>
           <p:cNvPicPr>
-            <a:picLocks noChangeAspect="1"/>
+            <a:picLocks noGrp="1" noChangeAspect="1"/>
           </p:cNvPicPr>
           <p:nvPr>
             <p:ph idx="1"/>
           </p:nvPr>
         </p:nvPicPr>
         <p:blipFill>
-          <a:blip r:embed="rId1"/>
+          <a:blip r:embed="rId2"/>
           <a:stretch>
             <a:fillRect/>
           </a:stretch>
@@ -9285,14 +9350,14 @@
         <p:nvPicPr>
           <p:cNvPr id="4" name="Content Placeholder 3" descr="useCase10"/>
           <p:cNvPicPr>
-            <a:picLocks noChangeAspect="1"/>
+            <a:picLocks noGrp="1" noChangeAspect="1"/>
           </p:cNvPicPr>
           <p:nvPr>
             <p:ph idx="1"/>
           </p:nvPr>
         </p:nvPicPr>
         <p:blipFill>
-          <a:blip r:embed="rId1"/>
+          <a:blip r:embed="rId2"/>
           <a:stretch>
             <a:fillRect/>
           </a:stretch>
@@ -9351,7 +9416,6 @@
               <a:rPr lang="" altLang="en-US" dirty="0"/>
               <a:t>1. Design: then vs Now</a:t>
             </a:r>
-            <a:endParaRPr lang="" altLang="en-US" dirty="0"/>
           </a:p>
         </p:txBody>
       </p:sp>
@@ -9393,7 +9457,9 @@
       <p:sp>
         <p:nvSpPr>
           <p:cNvPr id="3" name="Content Placeholder 2"/>
-          <p:cNvSpPr/>
+          <p:cNvSpPr>
+            <a:spLocks noGrp="1"/>
+          </p:cNvSpPr>
           <p:nvPr>
             <p:ph idx="1"/>
           </p:nvPr>
@@ -9401,19 +9467,18 @@
         <p:spPr/>
         <p:txBody>
           <a:bodyPr/>
+          <a:lstStyle/>
           <a:p>
             <a:r>
               <a:rPr lang="" altLang="en-US"/>
               <a:t>Iteration 1:</a:t>
             </a:r>
-            <a:endParaRPr lang="" altLang="en-US"/>
           </a:p>
           <a:p>
             <a:r>
               <a:rPr lang="" altLang="en-US"/>
               <a:t>The loading of different UI's was handled in different UIElements</a:t>
             </a:r>
-            <a:endParaRPr lang="" altLang="en-US"/>
           </a:p>
           <a:p>
             <a:pPr lvl="1"/>
@@ -9421,7 +9486,6 @@
               <a:rPr lang="" altLang="en-US"/>
               <a:t>e.g. ListView.loadFromTables()</a:t>
             </a:r>
-            <a:endParaRPr lang="" altLang="en-US"/>
           </a:p>
           <a:p>
             <a:pPr lvl="1"/>
@@ -9473,14 +9537,15 @@
               <a:rPr lang="" altLang="en-US" dirty="0"/>
               <a:t>1. Design: then vs Now</a:t>
             </a:r>
-            <a:endParaRPr lang="" altLang="en-US" dirty="0"/>
           </a:p>
         </p:txBody>
       </p:sp>
       <p:sp>
         <p:nvSpPr>
           <p:cNvPr id="3" name="Content Placeholder 2"/>
-          <p:cNvSpPr/>
+          <p:cNvSpPr>
+            <a:spLocks noGrp="1"/>
+          </p:cNvSpPr>
           <p:nvPr>
             <p:ph idx="1"/>
           </p:nvPr>
@@ -9493,6 +9558,7 @@
         </p:spPr>
         <p:txBody>
           <a:bodyPr/>
+          <a:lstStyle/>
           <a:p>
             <a:pPr marL="0" indent="0">
               <a:buNone/>
@@ -9501,7 +9567,6 @@
               <a:rPr lang="" altLang="en-US"/>
               <a:t>Iteration 2:</a:t>
             </a:r>
-            <a:endParaRPr lang="" altLang="en-US"/>
           </a:p>
           <a:p>
             <a:pPr>
@@ -9512,7 +9577,6 @@
               <a:rPr lang="" altLang="en-US"/>
               <a:t>Subwindows inherit from superclass UI</a:t>
             </a:r>
-            <a:endParaRPr lang="" altLang="en-US"/>
           </a:p>
           <a:p>
             <a:pPr>
@@ -9523,7 +9587,6 @@
               <a:rPr lang="" altLang="en-US"/>
               <a:t>Method loadUI() to create the necessary components</a:t>
             </a:r>
-            <a:endParaRPr lang="" altLang="en-US"/>
           </a:p>
           <a:p>
             <a:pPr>
@@ -9534,7 +9597,6 @@
               <a:rPr lang="" altLang="en-US"/>
               <a:t>All Tablr-logic is specified in the loading of a UI, not in UIElements</a:t>
             </a:r>
-            <a:endParaRPr lang="" altLang="en-US"/>
           </a:p>
           <a:p>
             <a:pPr>
@@ -9554,7 +9616,7 @@
           <p:nvPr/>
         </p:nvPicPr>
         <p:blipFill>
-          <a:blip r:embed="rId1"/>
+          <a:blip r:embed="rId2"/>
           <a:srcRect t="7937" b="6350"/>
           <a:stretch>
             <a:fillRect/>
@@ -9587,7 +9649,14 @@
         <p:cNvGrpSpPr/>
         <p:nvPr/>
       </p:nvGrpSpPr>
-      <p:grpSpPr/>
+      <p:grpSpPr>
+        <a:xfrm>
+          <a:off x="0" y="0"/>
+          <a:ext cx="0" cy="0"/>
+          <a:chOff x="0" y="0"/>
+          <a:chExt cx="0" cy="0"/>
+        </a:xfrm>
+      </p:grpSpPr>
       <p:sp>
         <p:nvSpPr>
           <p:cNvPr id="2" name="Title 1"/>
@@ -9601,12 +9670,12 @@
         <p:spPr/>
         <p:txBody>
           <a:bodyPr/>
+          <a:lstStyle/>
           <a:p>
             <a:r>
               <a:rPr lang="" altLang="en-US"/>
               <a:t>1. Design: then vs Now</a:t>
             </a:r>
-            <a:endParaRPr lang="" altLang="en-US"/>
           </a:p>
         </p:txBody>
       </p:sp>
@@ -9614,14 +9683,14 @@
         <p:nvPicPr>
           <p:cNvPr id="4" name="Content Placeholder 3" descr="Screenshot from 2019-04-29 15.25.29"/>
           <p:cNvPicPr>
-            <a:picLocks noChangeAspect="1"/>
+            <a:picLocks noGrp="1" noChangeAspect="1"/>
           </p:cNvPicPr>
           <p:nvPr>
             <p:ph idx="1"/>
           </p:nvPr>
         </p:nvPicPr>
         <p:blipFill>
-          <a:blip r:embed="rId1"/>
+          <a:blip r:embed="rId2"/>
           <a:stretch>
             <a:fillRect/>
           </a:stretch>
@@ -9656,12 +9725,12 @@
           <a:bodyPr wrap="square" rtlCol="0">
             <a:spAutoFit/>
           </a:bodyPr>
+          <a:lstStyle/>
           <a:p>
             <a:r>
               <a:rPr lang="" altLang="en-US"/>
               <a:t>Iteration 2: extensive use of Listeners to specify behaviour of UIElements</a:t>
             </a:r>
-            <a:endParaRPr lang="" altLang="en-US"/>
           </a:p>
         </p:txBody>
       </p:sp>
@@ -9682,7 +9751,14 @@
         <p:cNvGrpSpPr/>
         <p:nvPr/>
       </p:nvGrpSpPr>
-      <p:grpSpPr/>
+      <p:grpSpPr>
+        <a:xfrm>
+          <a:off x="0" y="0"/>
+          <a:ext cx="0" cy="0"/>
+          <a:chOff x="0" y="0"/>
+          <a:chExt cx="0" cy="0"/>
+        </a:xfrm>
+      </p:grpSpPr>
       <p:sp>
         <p:nvSpPr>
           <p:cNvPr id="2" name="Title 1"/>
@@ -9701,12 +9777,12 @@
         </p:spPr>
         <p:txBody>
           <a:bodyPr/>
+          <a:lstStyle/>
           <a:p>
             <a:r>
               <a:rPr lang="" altLang="en-US"/>
               <a:t>1. Design: class diagram</a:t>
             </a:r>
-            <a:endParaRPr lang="" altLang="en-US"/>
           </a:p>
         </p:txBody>
       </p:sp>
@@ -9714,14 +9790,14 @@
         <p:nvPicPr>
           <p:cNvPr id="4" name="Content Placeholder 3" descr="classdiagram_iteratie2_basic"/>
           <p:cNvPicPr>
-            <a:picLocks noChangeAspect="1"/>
+            <a:picLocks noGrp="1" noChangeAspect="1"/>
           </p:cNvPicPr>
           <p:nvPr>
             <p:ph idx="1"/>
           </p:nvPr>
         </p:nvPicPr>
         <p:blipFill>
-          <a:blip r:embed="rId1"/>
+          <a:blip r:embed="rId2"/>
           <a:stretch>
             <a:fillRect/>
           </a:stretch>
@@ -9753,19 +9829,26 @@
         <p:cNvGrpSpPr/>
         <p:nvPr/>
       </p:nvGrpSpPr>
-      <p:grpSpPr/>
+      <p:grpSpPr>
+        <a:xfrm>
+          <a:off x="0" y="0"/>
+          <a:ext cx="0" cy="0"/>
+          <a:chOff x="0" y="0"/>
+          <a:chExt cx="0" cy="0"/>
+        </a:xfrm>
+      </p:grpSpPr>
       <p:pic>
         <p:nvPicPr>
           <p:cNvPr id="4" name="Content Placeholder 3" descr="classdiagram_iteratie2"/>
           <p:cNvPicPr>
-            <a:picLocks noChangeAspect="1"/>
+            <a:picLocks noGrp="1" noChangeAspect="1"/>
           </p:cNvPicPr>
           <p:nvPr>
             <p:ph idx="1"/>
           </p:nvPr>
         </p:nvPicPr>
         <p:blipFill>
-          <a:blip r:embed="rId1"/>
+          <a:blip r:embed="rId2"/>
           <a:stretch>
             <a:fillRect/>
           </a:stretch>
@@ -9797,7 +9880,14 @@
         <p:cNvGrpSpPr/>
         <p:nvPr/>
       </p:nvGrpSpPr>
-      <p:grpSpPr/>
+      <p:grpSpPr>
+        <a:xfrm>
+          <a:off x="0" y="0"/>
+          <a:ext cx="0" cy="0"/>
+          <a:chOff x="0" y="0"/>
+          <a:chExt cx="0" cy="0"/>
+        </a:xfrm>
+      </p:grpSpPr>
       <p:sp>
         <p:nvSpPr>
           <p:cNvPr id="2" name="Title 1"/>
@@ -9816,12 +9906,12 @@
         </p:spPr>
         <p:txBody>
           <a:bodyPr/>
+          <a:lstStyle/>
           <a:p>
             <a:r>
               <a:rPr lang="" altLang="en-US"/>
               <a:t>1. Design: UI elements</a:t>
             </a:r>
-            <a:endParaRPr lang="" altLang="en-US"/>
           </a:p>
         </p:txBody>
       </p:sp>
@@ -9829,14 +9919,14 @@
         <p:nvPicPr>
           <p:cNvPr id="4" name="Content Placeholder 3" descr="ui"/>
           <p:cNvPicPr>
-            <a:picLocks noChangeAspect="1"/>
+            <a:picLocks noGrp="1" noChangeAspect="1"/>
           </p:cNvPicPr>
           <p:nvPr>
             <p:ph idx="1"/>
           </p:nvPr>
         </p:nvPicPr>
         <p:blipFill>
-          <a:blip r:embed="rId1"/>
+          <a:blip r:embed="rId2"/>
           <a:srcRect r="38888" b="54879"/>
           <a:stretch>
             <a:fillRect/>
@@ -10133,6 +10223,8 @@
       </a:bgFillStyleLst>
     </a:fmtScheme>
   </a:themeElements>
+  <a:objectDefaults/>
+  <a:extraClrSchemeLst/>
   <a:extLst>
     <a:ext uri="{05A4C25C-085E-4340-85A3-A5531E510DB2}">
       <thm15:themeFamily xmlns:thm15="http://schemas.microsoft.com/office/thememl/2012/main" name="Office Theme" id="{62F939B6-93AF-4DB8-9C6B-D6C7DFDC589F}" vid="{4A3C46E8-61CC-4603-A589-7422A47A8E4A}"/>
@@ -10392,6 +10484,8 @@
       </a:bgFillStyleLst>
     </a:fmtScheme>
   </a:themeElements>
+  <a:objectDefaults/>
+  <a:extraClrSchemeLst/>
   <a:extLst>
     <a:ext uri="{05A4C25C-085E-4340-85A3-A5531E510DB2}">
       <thm15:themeFamily xmlns:thm15="http://schemas.microsoft.com/office/thememl/2012/main" name="Office Theme" id="{62F939B6-93AF-4DB8-9C6B-D6C7DFDC589F}" vid="{4A3C46E8-61CC-4603-A589-7422A47A8E4A}"/>

</xml_diff>

<commit_message>
kleine edit tabel iteratie2
</commit_message>
<xml_diff>
--- a/Presentaties/Iteration2.pptx
+++ b/Presentaties/Iteration2.pptx
@@ -311,7 +311,7 @@
                       <a:cs typeface="+mn-cs"/>
                     </a:defRPr>
                   </a:pPr>
-                  <a:endParaRPr lang="en-US"/>
+                  <a:endParaRPr lang="nl-BE"/>
                 </a:p>
               </c:txPr>
               <c:dLblPos val="bestFit"/>
@@ -350,7 +350,7 @@
                       <a:cs typeface="+mn-cs"/>
                     </a:defRPr>
                   </a:pPr>
-                  <a:endParaRPr lang="en-US"/>
+                  <a:endParaRPr lang="nl-BE"/>
                 </a:p>
               </c:txPr>
               <c:dLblPos val="bestFit"/>
@@ -389,7 +389,7 @@
                       <a:cs typeface="+mn-cs"/>
                     </a:defRPr>
                   </a:pPr>
-                  <a:endParaRPr lang="en-US"/>
+                  <a:endParaRPr lang="nl-BE"/>
                 </a:p>
               </c:txPr>
               <c:dLblPos val="bestFit"/>
@@ -429,7 +429,7 @@
                     <a:cs typeface="+mn-cs"/>
                   </a:defRPr>
                 </a:pPr>
-                <a:endParaRPr lang="en-US"/>
+                <a:endParaRPr lang="nl-BE"/>
               </a:p>
             </c:txPr>
             <c:dLblPos val="bestFit"/>
@@ -536,7 +536,7 @@
       <a:pPr>
         <a:defRPr lang="en-US"/>
       </a:pPr>
-      <a:endParaRPr lang="en-US"/>
+      <a:endParaRPr lang="nl-BE"/>
     </a:p>
   </c:txPr>
   <c:externalData r:id="rId3">
@@ -9837,15 +9837,44 @@
           <a:chExt cx="0" cy="0"/>
         </a:xfrm>
       </p:grpSpPr>
+      <p:sp>
+        <p:nvSpPr>
+          <p:cNvPr id="3" name="Tijdelijke aanduiding voor inhoud 2">
+            <a:extLst>
+              <a:ext uri="{FF2B5EF4-FFF2-40B4-BE49-F238E27FC236}">
+                <a16:creationId xmlns:a16="http://schemas.microsoft.com/office/drawing/2014/main" id="{C2C6A4DF-8B68-4E2D-A0ED-E4BA72848BA6}"/>
+              </a:ext>
+            </a:extLst>
+          </p:cNvPr>
+          <p:cNvSpPr>
+            <a:spLocks noGrp="1"/>
+          </p:cNvSpPr>
+          <p:nvPr>
+            <p:ph idx="1"/>
+          </p:nvPr>
+        </p:nvSpPr>
+        <p:spPr/>
+        <p:txBody>
+          <a:bodyPr/>
+          <a:lstStyle/>
+          <a:p>
+            <a:endParaRPr lang="nl-BE"/>
+          </a:p>
+        </p:txBody>
+      </p:sp>
       <p:pic>
         <p:nvPicPr>
-          <p:cNvPr id="4" name="Content Placeholder 3" descr="classdiagram_iteratie2"/>
+          <p:cNvPr id="5" name="Afbeelding 4">
+            <a:extLst>
+              <a:ext uri="{FF2B5EF4-FFF2-40B4-BE49-F238E27FC236}">
+                <a16:creationId xmlns:a16="http://schemas.microsoft.com/office/drawing/2014/main" id="{0C083B91-CADC-4198-9E3D-CF25557ACF69}"/>
+              </a:ext>
+            </a:extLst>
+          </p:cNvPr>
           <p:cNvPicPr>
-            <a:picLocks noGrp="1" noChangeAspect="1"/>
+            <a:picLocks noChangeAspect="1"/>
           </p:cNvPicPr>
-          <p:nvPr>
-            <p:ph idx="1"/>
-          </p:nvPr>
+          <p:nvPr/>
         </p:nvPicPr>
         <p:blipFill>
           <a:blip r:embed="rId2"/>
@@ -9855,8 +9884,8 @@
         </p:blipFill>
         <p:spPr>
           <a:xfrm>
-            <a:off x="1624965" y="1270"/>
-            <a:ext cx="8942070" cy="6856095"/>
+            <a:off x="1548393" y="93306"/>
+            <a:ext cx="8545543" cy="6456784"/>
           </a:xfrm>
           <a:prstGeom prst="rect">
             <a:avLst/>

</xml_diff>

<commit_message>
Removed ugly bar in pp and made pdf to send
</commit_message>
<xml_diff>
--- a/Presentaties/Iteration2.pptx
+++ b/Presentaties/Iteration2.pptx
@@ -311,7 +311,7 @@
                       <a:cs typeface="+mn-cs"/>
                     </a:defRPr>
                   </a:pPr>
-                  <a:endParaRPr lang="nl-BE"/>
+                  <a:endParaRPr lang="en-US"/>
                 </a:p>
               </c:txPr>
               <c:dLblPos val="bestFit"/>
@@ -350,7 +350,7 @@
                       <a:cs typeface="+mn-cs"/>
                     </a:defRPr>
                   </a:pPr>
-                  <a:endParaRPr lang="nl-BE"/>
+                  <a:endParaRPr lang="en-US"/>
                 </a:p>
               </c:txPr>
               <c:dLblPos val="bestFit"/>
@@ -389,7 +389,7 @@
                       <a:cs typeface="+mn-cs"/>
                     </a:defRPr>
                   </a:pPr>
-                  <a:endParaRPr lang="nl-BE"/>
+                  <a:endParaRPr lang="en-US"/>
                 </a:p>
               </c:txPr>
               <c:dLblPos val="bestFit"/>
@@ -429,7 +429,7 @@
                     <a:cs typeface="+mn-cs"/>
                   </a:defRPr>
                 </a:pPr>
-                <a:endParaRPr lang="nl-BE"/>
+                <a:endParaRPr lang="en-US"/>
               </a:p>
             </c:txPr>
             <c:dLblPos val="bestFit"/>
@@ -536,7 +536,7 @@
       <a:pPr>
         <a:defRPr lang="en-US"/>
       </a:pPr>
-      <a:endParaRPr lang="nl-BE"/>
+      <a:endParaRPr lang="en-US"/>
     </a:p>
   </c:txPr>
   <c:externalData r:id="rId3">
@@ -1186,7 +1186,7 @@
           <a:p>
             <a:fld id="{3EFD42F7-718C-4B98-AAEC-167E6DDD60A7}" type="datetimeFigureOut">
               <a:rPr lang="en-US" smtClean="0"/>
-              <a:t>4/29/2019</a:t>
+              <a:t>4/30/2019</a:t>
             </a:fld>
             <a:endParaRPr lang="en-US"/>
           </a:p>
@@ -1730,7 +1730,7 @@
           <a:p>
             <a:fld id="{C6ACF9C8-6D65-41F9-9101-DBF005E879DE}" type="datetimeFigureOut">
               <a:rPr lang="en-US" smtClean="0"/>
-              <a:t>4/29/2019</a:t>
+              <a:t>4/30/2019</a:t>
             </a:fld>
             <a:endParaRPr lang="en-US"/>
           </a:p>
@@ -1933,7 +1933,7 @@
           <a:p>
             <a:fld id="{C6ACF9C8-6D65-41F9-9101-DBF005E879DE}" type="datetimeFigureOut">
               <a:rPr lang="en-US" smtClean="0"/>
-              <a:t>4/29/2019</a:t>
+              <a:t>4/30/2019</a:t>
             </a:fld>
             <a:endParaRPr lang="en-US"/>
           </a:p>
@@ -2184,7 +2184,7 @@
           <a:p>
             <a:fld id="{C6ACF9C8-6D65-41F9-9101-DBF005E879DE}" type="datetimeFigureOut">
               <a:rPr lang="en-US" smtClean="0"/>
-              <a:t>4/29/2019</a:t>
+              <a:t>4/30/2019</a:t>
             </a:fld>
             <a:endParaRPr lang="en-US"/>
           </a:p>
@@ -2353,7 +2353,7 @@
           <a:p>
             <a:fld id="{C6ACF9C8-6D65-41F9-9101-DBF005E879DE}" type="datetimeFigureOut">
               <a:rPr lang="en-US" smtClean="0"/>
-              <a:t>4/29/2019</a:t>
+              <a:t>4/30/2019</a:t>
             </a:fld>
             <a:endParaRPr lang="en-US"/>
           </a:p>
@@ -2691,7 +2691,7 @@
           <a:p>
             <a:fld id="{C6ACF9C8-6D65-41F9-9101-DBF005E879DE}" type="datetimeFigureOut">
               <a:rPr lang="en-US" smtClean="0"/>
-              <a:t>4/29/2019</a:t>
+              <a:t>4/30/2019</a:t>
             </a:fld>
             <a:endParaRPr lang="en-US"/>
           </a:p>
@@ -2961,7 +2961,7 @@
           <a:p>
             <a:fld id="{C6ACF9C8-6D65-41F9-9101-DBF005E879DE}" type="datetimeFigureOut">
               <a:rPr lang="en-US" smtClean="0"/>
-              <a:t>4/29/2019</a:t>
+              <a:t>4/30/2019</a:t>
             </a:fld>
             <a:endParaRPr lang="en-US"/>
           </a:p>
@@ -3335,7 +3335,7 @@
           <a:p>
             <a:fld id="{C6ACF9C8-6D65-41F9-9101-DBF005E879DE}" type="datetimeFigureOut">
               <a:rPr lang="en-US" smtClean="0"/>
-              <a:t>4/29/2019</a:t>
+              <a:t>4/30/2019</a:t>
             </a:fld>
             <a:endParaRPr lang="en-US"/>
           </a:p>
@@ -3448,7 +3448,7 @@
           <a:p>
             <a:fld id="{C6ACF9C8-6D65-41F9-9101-DBF005E879DE}" type="datetimeFigureOut">
               <a:rPr lang="en-US" smtClean="0"/>
-              <a:t>4/29/2019</a:t>
+              <a:t>4/30/2019</a:t>
             </a:fld>
             <a:endParaRPr lang="en-US"/>
           </a:p>
@@ -3614,7 +3614,7 @@
           <a:p>
             <a:fld id="{C6ACF9C8-6D65-41F9-9101-DBF005E879DE}" type="datetimeFigureOut">
               <a:rPr lang="en-US" smtClean="0"/>
-              <a:t>4/29/2019</a:t>
+              <a:t>4/30/2019</a:t>
             </a:fld>
             <a:endParaRPr lang="en-US"/>
           </a:p>
@@ -3963,7 +3963,7 @@
           <a:p>
             <a:fld id="{C6ACF9C8-6D65-41F9-9101-DBF005E879DE}" type="datetimeFigureOut">
               <a:rPr lang="en-US" smtClean="0"/>
-              <a:t>4/29/2019</a:t>
+              <a:t>4/30/2019</a:t>
             </a:fld>
             <a:endParaRPr lang="en-US"/>
           </a:p>
@@ -4340,7 +4340,7 @@
           <a:p>
             <a:fld id="{C6ACF9C8-6D65-41F9-9101-DBF005E879DE}" type="datetimeFigureOut">
               <a:rPr lang="en-US" smtClean="0"/>
-              <a:t>4/29/2019</a:t>
+              <a:t>4/30/2019</a:t>
             </a:fld>
             <a:endParaRPr lang="en-US"/>
           </a:p>
@@ -4622,7 +4622,7 @@
           <a:p>
             <a:fld id="{C6ACF9C8-6D65-41F9-9101-DBF005E879DE}" type="datetimeFigureOut">
               <a:rPr lang="en-US" smtClean="0"/>
-              <a:t>4/29/2019</a:t>
+              <a:t>4/30/2019</a:t>
             </a:fld>
             <a:endParaRPr lang="en-US"/>
           </a:p>
@@ -9419,41 +9419,6 @@
           </a:p>
         </p:txBody>
       </p:sp>
-      <p:cxnSp>
-        <p:nvCxnSpPr>
-          <p:cNvPr id="7" name="Straight Connector 6"/>
-          <p:cNvCxnSpPr/>
-          <p:nvPr/>
-        </p:nvCxnSpPr>
-        <p:spPr>
-          <a:xfrm flipH="1">
-            <a:off x="0" y="4068661"/>
-            <a:ext cx="637563" cy="0"/>
-          </a:xfrm>
-          <a:prstGeom prst="line">
-            <a:avLst/>
-          </a:prstGeom>
-          <a:ln>
-            <a:solidFill>
-              <a:schemeClr val="tx1"/>
-            </a:solidFill>
-          </a:ln>
-        </p:spPr>
-        <p:style>
-          <a:lnRef idx="1">
-            <a:schemeClr val="accent1"/>
-          </a:lnRef>
-          <a:fillRef idx="0">
-            <a:schemeClr val="accent1"/>
-          </a:fillRef>
-          <a:effectRef idx="0">
-            <a:schemeClr val="accent1"/>
-          </a:effectRef>
-          <a:fontRef idx="minor">
-            <a:schemeClr val="tx1"/>
-          </a:fontRef>
-        </p:style>
-      </p:cxnSp>
       <p:sp>
         <p:nvSpPr>
           <p:cNvPr id="3" name="Content Placeholder 2"/>

</xml_diff>